<commit_message>
Document organization of Ubicity profiles (#206)
* Add files via upload

* Add files via upload

* Show organization of Ubicity profiles

* Document organization of Ubicity profiles
</commit_message>
<xml_diff>
--- a/profiles/com/ubicity/sources/figures.pptx
+++ b/profiles/com/ubicity/sources/figures.pptx
@@ -5,7 +5,7 @@
     <p:sldMasterId id="2147483648" r:id="rId1"/>
   </p:sldMasterIdLst>
   <p:notesMasterIdLst>
-    <p:notesMasterId r:id="rId9"/>
+    <p:notesMasterId r:id="rId10"/>
   </p:notesMasterIdLst>
   <p:sldIdLst>
     <p:sldId id="265" r:id="rId2"/>
@@ -15,6 +15,7 @@
     <p:sldId id="263" r:id="rId6"/>
     <p:sldId id="261" r:id="rId7"/>
     <p:sldId id="264" r:id="rId8"/>
+    <p:sldId id="266" r:id="rId9"/>
   </p:sldIdLst>
   <p:sldSz cx="12192000" cy="6858000"/>
   <p:notesSz cx="6858000" cy="9144000"/>
@@ -203,7 +204,7 @@
           <a:p>
             <a:fld id="{9BC9C640-FDAB-4920-985D-AE6877D6D812}" type="datetimeFigureOut">
               <a:rPr lang="en-US" smtClean="0"/>
-              <a:t>3/14/2024</a:t>
+              <a:t>7/21/2025</a:t>
             </a:fld>
             <a:endParaRPr lang="en-US"/>
           </a:p>
@@ -617,7 +618,7 @@
           <a:p>
             <a:fld id="{7588158F-7D22-4D02-A7C1-554F35EEE72C}" type="datetimeFigureOut">
               <a:rPr lang="en-US" smtClean="0"/>
-              <a:t>3/14/2024</a:t>
+              <a:t>7/21/2025</a:t>
             </a:fld>
             <a:endParaRPr lang="en-US"/>
           </a:p>
@@ -815,7 +816,7 @@
           <a:p>
             <a:fld id="{7588158F-7D22-4D02-A7C1-554F35EEE72C}" type="datetimeFigureOut">
               <a:rPr lang="en-US" smtClean="0"/>
-              <a:t>3/14/2024</a:t>
+              <a:t>7/21/2025</a:t>
             </a:fld>
             <a:endParaRPr lang="en-US"/>
           </a:p>
@@ -1023,7 +1024,7 @@
           <a:p>
             <a:fld id="{7588158F-7D22-4D02-A7C1-554F35EEE72C}" type="datetimeFigureOut">
               <a:rPr lang="en-US" smtClean="0"/>
-              <a:t>3/14/2024</a:t>
+              <a:t>7/21/2025</a:t>
             </a:fld>
             <a:endParaRPr lang="en-US"/>
           </a:p>
@@ -1221,7 +1222,7 @@
           <a:p>
             <a:fld id="{7588158F-7D22-4D02-A7C1-554F35EEE72C}" type="datetimeFigureOut">
               <a:rPr lang="en-US" smtClean="0"/>
-              <a:t>3/14/2024</a:t>
+              <a:t>7/21/2025</a:t>
             </a:fld>
             <a:endParaRPr lang="en-US"/>
           </a:p>
@@ -1496,7 +1497,7 @@
           <a:p>
             <a:fld id="{7588158F-7D22-4D02-A7C1-554F35EEE72C}" type="datetimeFigureOut">
               <a:rPr lang="en-US" smtClean="0"/>
-              <a:t>3/14/2024</a:t>
+              <a:t>7/21/2025</a:t>
             </a:fld>
             <a:endParaRPr lang="en-US"/>
           </a:p>
@@ -1761,7 +1762,7 @@
           <a:p>
             <a:fld id="{7588158F-7D22-4D02-A7C1-554F35EEE72C}" type="datetimeFigureOut">
               <a:rPr lang="en-US" smtClean="0"/>
-              <a:t>3/14/2024</a:t>
+              <a:t>7/21/2025</a:t>
             </a:fld>
             <a:endParaRPr lang="en-US"/>
           </a:p>
@@ -2173,7 +2174,7 @@
           <a:p>
             <a:fld id="{7588158F-7D22-4D02-A7C1-554F35EEE72C}" type="datetimeFigureOut">
               <a:rPr lang="en-US" smtClean="0"/>
-              <a:t>3/14/2024</a:t>
+              <a:t>7/21/2025</a:t>
             </a:fld>
             <a:endParaRPr lang="en-US"/>
           </a:p>
@@ -2314,7 +2315,7 @@
           <a:p>
             <a:fld id="{7588158F-7D22-4D02-A7C1-554F35EEE72C}" type="datetimeFigureOut">
               <a:rPr lang="en-US" smtClean="0"/>
-              <a:t>3/14/2024</a:t>
+              <a:t>7/21/2025</a:t>
             </a:fld>
             <a:endParaRPr lang="en-US"/>
           </a:p>
@@ -2427,7 +2428,7 @@
           <a:p>
             <a:fld id="{7588158F-7D22-4D02-A7C1-554F35EEE72C}" type="datetimeFigureOut">
               <a:rPr lang="en-US" smtClean="0"/>
-              <a:t>3/14/2024</a:t>
+              <a:t>7/21/2025</a:t>
             </a:fld>
             <a:endParaRPr lang="en-US"/>
           </a:p>
@@ -2738,7 +2739,7 @@
           <a:p>
             <a:fld id="{7588158F-7D22-4D02-A7C1-554F35EEE72C}" type="datetimeFigureOut">
               <a:rPr lang="en-US" smtClean="0"/>
-              <a:t>3/14/2024</a:t>
+              <a:t>7/21/2025</a:t>
             </a:fld>
             <a:endParaRPr lang="en-US"/>
           </a:p>
@@ -3026,7 +3027,7 @@
           <a:p>
             <a:fld id="{7588158F-7D22-4D02-A7C1-554F35EEE72C}" type="datetimeFigureOut">
               <a:rPr lang="en-US" smtClean="0"/>
-              <a:t>3/14/2024</a:t>
+              <a:t>7/21/2025</a:t>
             </a:fld>
             <a:endParaRPr lang="en-US"/>
           </a:p>
@@ -3267,7 +3268,7 @@
           <a:p>
             <a:fld id="{7588158F-7D22-4D02-A7C1-554F35EEE72C}" type="datetimeFigureOut">
               <a:rPr lang="en-US" smtClean="0"/>
-              <a:t>3/14/2024</a:t>
+              <a:t>7/21/2025</a:t>
             </a:fld>
             <a:endParaRPr lang="en-US"/>
           </a:p>
@@ -9683,6 +9684,1186 @@
 </p:sld>
 </file>
 
+<file path=ppt/slides/slide8.xml><?xml version="1.0" encoding="utf-8"?>
+<p:sld xmlns:a="http://schemas.openxmlformats.org/drawingml/2006/main" xmlns:r="http://schemas.openxmlformats.org/officeDocument/2006/relationships" xmlns:p="http://schemas.openxmlformats.org/presentationml/2006/main">
+  <p:cSld>
+    <p:spTree>
+      <p:nvGrpSpPr>
+        <p:cNvPr id="1" name=""/>
+        <p:cNvGrpSpPr/>
+        <p:nvPr/>
+      </p:nvGrpSpPr>
+      <p:grpSpPr>
+        <a:xfrm>
+          <a:off x="0" y="0"/>
+          <a:ext cx="0" cy="0"/>
+          <a:chOff x="0" y="0"/>
+          <a:chExt cx="0" cy="0"/>
+        </a:xfrm>
+      </p:grpSpPr>
+      <p:grpSp>
+        <p:nvGrpSpPr>
+          <p:cNvPr id="45" name="Group 44">
+            <a:extLst>
+              <a:ext uri="{FF2B5EF4-FFF2-40B4-BE49-F238E27FC236}">
+                <a16:creationId xmlns:a16="http://schemas.microsoft.com/office/drawing/2014/main" id="{9E293FAD-F203-2385-57F1-D8F8D47C9159}"/>
+              </a:ext>
+            </a:extLst>
+          </p:cNvPr>
+          <p:cNvGrpSpPr/>
+          <p:nvPr/>
+        </p:nvGrpSpPr>
+        <p:grpSpPr>
+          <a:xfrm>
+            <a:off x="3199491" y="1567735"/>
+            <a:ext cx="5793019" cy="3722530"/>
+            <a:chOff x="3110846" y="1725228"/>
+            <a:chExt cx="5793019" cy="3722530"/>
+          </a:xfrm>
+        </p:grpSpPr>
+        <p:cxnSp>
+          <p:nvCxnSpPr>
+            <p:cNvPr id="8" name="Straight Arrow Connector 7">
+              <a:extLst>
+                <a:ext uri="{FF2B5EF4-FFF2-40B4-BE49-F238E27FC236}">
+                  <a16:creationId xmlns:a16="http://schemas.microsoft.com/office/drawing/2014/main" id="{13C166FC-2FBD-9E88-15CA-22E6FDF98AD3}"/>
+                </a:ext>
+              </a:extLst>
+            </p:cNvPr>
+            <p:cNvCxnSpPr>
+              <a:cxnSpLocks/>
+            </p:cNvCxnSpPr>
+            <p:nvPr/>
+          </p:nvCxnSpPr>
+          <p:spPr>
+            <a:xfrm flipV="1">
+              <a:off x="5729035" y="3332545"/>
+              <a:ext cx="540563" cy="949734"/>
+            </a:xfrm>
+            <a:prstGeom prst="straightConnector1">
+              <a:avLst/>
+            </a:prstGeom>
+            <a:noFill/>
+            <a:ln w="12700" cap="flat" cmpd="sng" algn="ctr">
+              <a:solidFill>
+                <a:sysClr val="windowText" lastClr="000000"/>
+              </a:solidFill>
+              <a:prstDash val="solid"/>
+              <a:tailEnd type="triangle" w="lg" len="lg"/>
+            </a:ln>
+            <a:effectLst/>
+          </p:spPr>
+        </p:cxnSp>
+        <p:cxnSp>
+          <p:nvCxnSpPr>
+            <p:cNvPr id="9" name="Straight Arrow Connector 8">
+              <a:extLst>
+                <a:ext uri="{FF2B5EF4-FFF2-40B4-BE49-F238E27FC236}">
+                  <a16:creationId xmlns:a16="http://schemas.microsoft.com/office/drawing/2014/main" id="{7ED067B3-94DD-863D-3326-118B3FD359F2}"/>
+                </a:ext>
+              </a:extLst>
+            </p:cNvPr>
+            <p:cNvCxnSpPr>
+              <a:cxnSpLocks/>
+            </p:cNvCxnSpPr>
+            <p:nvPr/>
+          </p:nvCxnSpPr>
+          <p:spPr>
+            <a:xfrm flipH="1" flipV="1">
+              <a:off x="6878885" y="3224934"/>
+              <a:ext cx="981260" cy="1103204"/>
+            </a:xfrm>
+            <a:prstGeom prst="straightConnector1">
+              <a:avLst/>
+            </a:prstGeom>
+            <a:noFill/>
+            <a:ln w="12700" cap="flat" cmpd="sng" algn="ctr">
+              <a:solidFill>
+                <a:sysClr val="windowText" lastClr="000000"/>
+              </a:solidFill>
+              <a:prstDash val="solid"/>
+              <a:tailEnd type="triangle" w="lg" len="lg"/>
+            </a:ln>
+            <a:effectLst/>
+          </p:spPr>
+        </p:cxnSp>
+        <p:cxnSp>
+          <p:nvCxnSpPr>
+            <p:cNvPr id="10" name="Straight Arrow Connector 9">
+              <a:extLst>
+                <a:ext uri="{FF2B5EF4-FFF2-40B4-BE49-F238E27FC236}">
+                  <a16:creationId xmlns:a16="http://schemas.microsoft.com/office/drawing/2014/main" id="{E19922CC-D8E2-A54F-B6EA-BDC8F1E5EDE2}"/>
+                </a:ext>
+              </a:extLst>
+            </p:cNvPr>
+            <p:cNvCxnSpPr>
+              <a:cxnSpLocks/>
+              <a:endCxn id="3" idx="2"/>
+            </p:cNvCxnSpPr>
+            <p:nvPr/>
+          </p:nvCxnSpPr>
+          <p:spPr>
+            <a:xfrm flipH="1" flipV="1">
+              <a:off x="6611609" y="3289719"/>
+              <a:ext cx="171863" cy="992560"/>
+            </a:xfrm>
+            <a:prstGeom prst="straightConnector1">
+              <a:avLst/>
+            </a:prstGeom>
+            <a:noFill/>
+            <a:ln w="12700" cap="flat" cmpd="sng" algn="ctr">
+              <a:solidFill>
+                <a:sysClr val="windowText" lastClr="000000"/>
+              </a:solidFill>
+              <a:prstDash val="solid"/>
+              <a:tailEnd type="triangle" w="lg" len="lg"/>
+            </a:ln>
+            <a:effectLst/>
+          </p:spPr>
+        </p:cxnSp>
+        <p:cxnSp>
+          <p:nvCxnSpPr>
+            <p:cNvPr id="13" name="Straight Arrow Connector 12">
+              <a:extLst>
+                <a:ext uri="{FF2B5EF4-FFF2-40B4-BE49-F238E27FC236}">
+                  <a16:creationId xmlns:a16="http://schemas.microsoft.com/office/drawing/2014/main" id="{EAECE77E-5FC8-CC3C-5A4B-E1BB9C75139C}"/>
+                </a:ext>
+              </a:extLst>
+            </p:cNvPr>
+            <p:cNvCxnSpPr>
+              <a:cxnSpLocks/>
+              <a:stCxn id="2" idx="0"/>
+            </p:cNvCxnSpPr>
+            <p:nvPr/>
+          </p:nvCxnSpPr>
+          <p:spPr>
+            <a:xfrm flipV="1">
+              <a:off x="3749828" y="2707524"/>
+              <a:ext cx="540876" cy="562290"/>
+            </a:xfrm>
+            <a:prstGeom prst="straightConnector1">
+              <a:avLst/>
+            </a:prstGeom>
+            <a:noFill/>
+            <a:ln w="12700" cap="flat" cmpd="sng" algn="ctr">
+              <a:solidFill>
+                <a:sysClr val="windowText" lastClr="000000"/>
+              </a:solidFill>
+              <a:prstDash val="solid"/>
+              <a:tailEnd type="triangle" w="lg" len="lg"/>
+            </a:ln>
+            <a:effectLst/>
+          </p:spPr>
+        </p:cxnSp>
+        <p:cxnSp>
+          <p:nvCxnSpPr>
+            <p:cNvPr id="14" name="Straight Arrow Connector 13">
+              <a:extLst>
+                <a:ext uri="{FF2B5EF4-FFF2-40B4-BE49-F238E27FC236}">
+                  <a16:creationId xmlns:a16="http://schemas.microsoft.com/office/drawing/2014/main" id="{BE1F8987-E183-D69F-7730-0A59AE600927}"/>
+                </a:ext>
+              </a:extLst>
+            </p:cNvPr>
+            <p:cNvCxnSpPr>
+              <a:cxnSpLocks/>
+            </p:cNvCxnSpPr>
+            <p:nvPr/>
+          </p:nvCxnSpPr>
+          <p:spPr>
+            <a:xfrm flipH="1" flipV="1">
+              <a:off x="5199224" y="2570864"/>
+              <a:ext cx="867518" cy="334899"/>
+            </a:xfrm>
+            <a:prstGeom prst="straightConnector1">
+              <a:avLst/>
+            </a:prstGeom>
+            <a:noFill/>
+            <a:ln w="12700" cap="flat" cmpd="sng" algn="ctr">
+              <a:solidFill>
+                <a:sysClr val="windowText" lastClr="000000"/>
+              </a:solidFill>
+              <a:prstDash val="solid"/>
+              <a:tailEnd type="triangle" w="lg" len="lg"/>
+            </a:ln>
+            <a:effectLst/>
+          </p:spPr>
+        </p:cxnSp>
+        <p:grpSp>
+          <p:nvGrpSpPr>
+            <p:cNvPr id="25" name="Group 24">
+              <a:extLst>
+                <a:ext uri="{FF2B5EF4-FFF2-40B4-BE49-F238E27FC236}">
+                  <a16:creationId xmlns:a16="http://schemas.microsoft.com/office/drawing/2014/main" id="{2ED395F2-628A-524A-A355-693E0D05D893}"/>
+                </a:ext>
+              </a:extLst>
+            </p:cNvPr>
+            <p:cNvGrpSpPr/>
+            <p:nvPr/>
+          </p:nvGrpSpPr>
+          <p:grpSpPr>
+            <a:xfrm>
+              <a:off x="4218009" y="1725228"/>
+              <a:ext cx="1152150" cy="982296"/>
+              <a:chOff x="4171829" y="1725228"/>
+              <a:chExt cx="1152150" cy="982296"/>
+            </a:xfrm>
+          </p:grpSpPr>
+          <p:sp>
+            <p:nvSpPr>
+              <p:cNvPr id="11" name="Flowchart: Multidocument 10">
+                <a:extLst>
+                  <a:ext uri="{FF2B5EF4-FFF2-40B4-BE49-F238E27FC236}">
+                    <a16:creationId xmlns:a16="http://schemas.microsoft.com/office/drawing/2014/main" id="{04C52AB1-DB63-400E-0C51-63BC2EB5D291}"/>
+                  </a:ext>
+                </a:extLst>
+              </p:cNvPr>
+              <p:cNvSpPr/>
+              <p:nvPr/>
+            </p:nvSpPr>
+            <p:spPr>
+              <a:xfrm>
+                <a:off x="4290704" y="2021724"/>
+                <a:ext cx="914400" cy="685800"/>
+              </a:xfrm>
+              <a:prstGeom prst="flowChartMultidocument">
+                <a:avLst/>
+              </a:prstGeom>
+              <a:noFill/>
+              <a:ln w="19050" cap="flat" cmpd="sng" algn="ctr">
+                <a:solidFill>
+                  <a:sysClr val="windowText" lastClr="000000"/>
+                </a:solidFill>
+                <a:prstDash val="solid"/>
+              </a:ln>
+              <a:effectLst/>
+            </p:spPr>
+            <p:txBody>
+              <a:bodyPr tIns="91440" rtlCol="0" anchor="t" anchorCtr="0"/>
+              <a:lstStyle/>
+              <a:p>
+                <a:r>
+                  <a:rPr lang="en-US" sz="1100" kern="0" dirty="0">
+                    <a:solidFill>
+                      <a:prstClr val="black"/>
+                    </a:solidFill>
+                    <a:latin typeface="Calibri" panose="020F0502020204030204"/>
+                  </a:rPr>
+                  <a:t>Core Profile</a:t>
+                </a:r>
+              </a:p>
+            </p:txBody>
+          </p:sp>
+          <p:sp>
+            <p:nvSpPr>
+              <p:cNvPr id="15" name="TextBox 14">
+                <a:extLst>
+                  <a:ext uri="{FF2B5EF4-FFF2-40B4-BE49-F238E27FC236}">
+                    <a16:creationId xmlns:a16="http://schemas.microsoft.com/office/drawing/2014/main" id="{B69D0241-086D-AA8C-88E2-4FD64AD7E489}"/>
+                  </a:ext>
+                </a:extLst>
+              </p:cNvPr>
+              <p:cNvSpPr txBox="1"/>
+              <p:nvPr/>
+            </p:nvSpPr>
+            <p:spPr>
+              <a:xfrm>
+                <a:off x="4171829" y="1725228"/>
+                <a:ext cx="1152150" cy="246221"/>
+              </a:xfrm>
+              <a:prstGeom prst="rect">
+                <a:avLst/>
+              </a:prstGeom>
+              <a:noFill/>
+            </p:spPr>
+            <p:txBody>
+              <a:bodyPr wrap="square" rtlCol="0">
+                <a:spAutoFit/>
+              </a:bodyPr>
+              <a:lstStyle>
+                <a:defPPr>
+                  <a:defRPr lang="en-US"/>
+                </a:defPPr>
+                <a:lvl1pPr algn="ctr">
+                  <a:defRPr sz="1000"/>
+                </a:lvl1pPr>
+              </a:lstStyle>
+              <a:p>
+                <a:r>
+                  <a:rPr lang="en-US" dirty="0"/>
+                  <a:t>Shared Definitions</a:t>
+                </a:r>
+              </a:p>
+            </p:txBody>
+          </p:sp>
+        </p:grpSp>
+        <p:grpSp>
+          <p:nvGrpSpPr>
+            <p:cNvPr id="27" name="Group 26">
+              <a:extLst>
+                <a:ext uri="{FF2B5EF4-FFF2-40B4-BE49-F238E27FC236}">
+                  <a16:creationId xmlns:a16="http://schemas.microsoft.com/office/drawing/2014/main" id="{E4893946-900A-4E97-69C0-6DAF02B3D6D4}"/>
+                </a:ext>
+              </a:extLst>
+            </p:cNvPr>
+            <p:cNvGrpSpPr/>
+            <p:nvPr/>
+          </p:nvGrpSpPr>
+          <p:grpSpPr>
+            <a:xfrm>
+              <a:off x="3110846" y="3269814"/>
+              <a:ext cx="1152150" cy="1075125"/>
+              <a:chOff x="1948449" y="3468130"/>
+              <a:chExt cx="1152150" cy="1075125"/>
+            </a:xfrm>
+          </p:grpSpPr>
+          <p:sp>
+            <p:nvSpPr>
+              <p:cNvPr id="2" name="Flowchart: Multidocument 1">
+                <a:extLst>
+                  <a:ext uri="{FF2B5EF4-FFF2-40B4-BE49-F238E27FC236}">
+                    <a16:creationId xmlns:a16="http://schemas.microsoft.com/office/drawing/2014/main" id="{98CF8CF5-EEE5-13D2-D8E3-EFFFB9A1AECE}"/>
+                  </a:ext>
+                </a:extLst>
+              </p:cNvPr>
+              <p:cNvSpPr/>
+              <p:nvPr/>
+            </p:nvSpPr>
+            <p:spPr>
+              <a:xfrm>
+                <a:off x="2067324" y="3468130"/>
+                <a:ext cx="914400" cy="685800"/>
+              </a:xfrm>
+              <a:prstGeom prst="flowChartMultidocument">
+                <a:avLst/>
+              </a:prstGeom>
+              <a:noFill/>
+              <a:ln w="19050" cap="flat" cmpd="sng" algn="ctr">
+                <a:solidFill>
+                  <a:sysClr val="windowText" lastClr="000000"/>
+                </a:solidFill>
+                <a:prstDash val="solid"/>
+              </a:ln>
+              <a:effectLst/>
+            </p:spPr>
+            <p:txBody>
+              <a:bodyPr tIns="91440" rtlCol="0" anchor="t" anchorCtr="0"/>
+              <a:lstStyle/>
+              <a:p>
+                <a:r>
+                  <a:rPr lang="en-US" sz="1100" kern="0" dirty="0">
+                    <a:solidFill>
+                      <a:prstClr val="black"/>
+                    </a:solidFill>
+                    <a:latin typeface="Calibri" panose="020F0502020204030204"/>
+                  </a:rPr>
+                  <a:t>Cloud Profile</a:t>
+                </a:r>
+              </a:p>
+            </p:txBody>
+          </p:sp>
+          <p:sp>
+            <p:nvSpPr>
+              <p:cNvPr id="16" name="TextBox 15">
+                <a:extLst>
+                  <a:ext uri="{FF2B5EF4-FFF2-40B4-BE49-F238E27FC236}">
+                    <a16:creationId xmlns:a16="http://schemas.microsoft.com/office/drawing/2014/main" id="{2007067B-B010-C697-2C0E-9D285B242743}"/>
+                  </a:ext>
+                </a:extLst>
+              </p:cNvPr>
+              <p:cNvSpPr txBox="1"/>
+              <p:nvPr/>
+            </p:nvSpPr>
+            <p:spPr>
+              <a:xfrm>
+                <a:off x="1948449" y="4143145"/>
+                <a:ext cx="1152150" cy="400110"/>
+              </a:xfrm>
+              <a:prstGeom prst="rect">
+                <a:avLst/>
+              </a:prstGeom>
+              <a:noFill/>
+            </p:spPr>
+            <p:txBody>
+              <a:bodyPr wrap="square" rtlCol="0">
+                <a:spAutoFit/>
+              </a:bodyPr>
+              <a:lstStyle/>
+              <a:p>
+                <a:pPr algn="ctr"/>
+                <a:r>
+                  <a:rPr lang="en-US" sz="1000" dirty="0"/>
+                  <a:t>Abstract Definitions</a:t>
+                </a:r>
+              </a:p>
+            </p:txBody>
+          </p:sp>
+        </p:grpSp>
+        <p:grpSp>
+          <p:nvGrpSpPr>
+            <p:cNvPr id="26" name="Group 25">
+              <a:extLst>
+                <a:ext uri="{FF2B5EF4-FFF2-40B4-BE49-F238E27FC236}">
+                  <a16:creationId xmlns:a16="http://schemas.microsoft.com/office/drawing/2014/main" id="{5FCD8E72-BC80-022F-7021-B376168D229A}"/>
+                </a:ext>
+              </a:extLst>
+            </p:cNvPr>
+            <p:cNvGrpSpPr/>
+            <p:nvPr/>
+          </p:nvGrpSpPr>
+          <p:grpSpPr>
+            <a:xfrm>
+              <a:off x="6099119" y="2021724"/>
+              <a:ext cx="1152150" cy="1293966"/>
+              <a:chOff x="6874250" y="1899114"/>
+              <a:chExt cx="1152150" cy="1293966"/>
+            </a:xfrm>
+          </p:grpSpPr>
+          <p:sp>
+            <p:nvSpPr>
+              <p:cNvPr id="3" name="Flowchart: Multidocument 2">
+                <a:extLst>
+                  <a:ext uri="{FF2B5EF4-FFF2-40B4-BE49-F238E27FC236}">
+                    <a16:creationId xmlns:a16="http://schemas.microsoft.com/office/drawing/2014/main" id="{EC009B6F-8E9E-4D22-AE73-7C93D36EF2C5}"/>
+                  </a:ext>
+                </a:extLst>
+              </p:cNvPr>
+              <p:cNvSpPr/>
+              <p:nvPr/>
+            </p:nvSpPr>
+            <p:spPr>
+              <a:xfrm>
+                <a:off x="6993125" y="2507280"/>
+                <a:ext cx="914400" cy="685800"/>
+              </a:xfrm>
+              <a:prstGeom prst="flowChartMultidocument">
+                <a:avLst/>
+              </a:prstGeom>
+              <a:noFill/>
+              <a:ln w="19050" cap="flat" cmpd="sng" algn="ctr">
+                <a:solidFill>
+                  <a:sysClr val="windowText" lastClr="000000"/>
+                </a:solidFill>
+                <a:prstDash val="solid"/>
+              </a:ln>
+              <a:effectLst/>
+            </p:spPr>
+            <p:txBody>
+              <a:bodyPr tIns="91440" rIns="0" rtlCol="0" anchor="t" anchorCtr="0"/>
+              <a:lstStyle/>
+              <a:p>
+                <a:r>
+                  <a:rPr lang="en-US" sz="1100" kern="0" dirty="0">
+                    <a:solidFill>
+                      <a:prstClr val="black"/>
+                    </a:solidFill>
+                    <a:latin typeface="Calibri" panose="020F0502020204030204"/>
+                  </a:rPr>
+                  <a:t>Ubicity Profile</a:t>
+                </a:r>
+              </a:p>
+            </p:txBody>
+          </p:sp>
+          <p:sp>
+            <p:nvSpPr>
+              <p:cNvPr id="17" name="TextBox 16">
+                <a:extLst>
+                  <a:ext uri="{FF2B5EF4-FFF2-40B4-BE49-F238E27FC236}">
+                    <a16:creationId xmlns:a16="http://schemas.microsoft.com/office/drawing/2014/main" id="{91BEE4F1-483A-0E5B-069A-69B44CF4D6FC}"/>
+                  </a:ext>
+                </a:extLst>
+              </p:cNvPr>
+              <p:cNvSpPr txBox="1"/>
+              <p:nvPr/>
+            </p:nvSpPr>
+            <p:spPr>
+              <a:xfrm>
+                <a:off x="6874250" y="1899114"/>
+                <a:ext cx="1152150" cy="553998"/>
+              </a:xfrm>
+              <a:prstGeom prst="rect">
+                <a:avLst/>
+              </a:prstGeom>
+              <a:noFill/>
+            </p:spPr>
+            <p:txBody>
+              <a:bodyPr wrap="square" rtlCol="0">
+                <a:spAutoFit/>
+              </a:bodyPr>
+              <a:lstStyle>
+                <a:defPPr>
+                  <a:defRPr lang="en-US"/>
+                </a:defPPr>
+                <a:lvl1pPr algn="ctr">
+                  <a:defRPr sz="1000"/>
+                </a:lvl1pPr>
+              </a:lstStyle>
+              <a:p>
+                <a:r>
+                  <a:rPr lang="en-US" dirty="0"/>
+                  <a:t>Technology Specific  Definitions</a:t>
+                </a:r>
+              </a:p>
+            </p:txBody>
+          </p:sp>
+        </p:grpSp>
+        <p:sp>
+          <p:nvSpPr>
+            <p:cNvPr id="18" name="TextBox 17">
+              <a:extLst>
+                <a:ext uri="{FF2B5EF4-FFF2-40B4-BE49-F238E27FC236}">
+                  <a16:creationId xmlns:a16="http://schemas.microsoft.com/office/drawing/2014/main" id="{027702F9-A6DC-F401-DD1F-2D0BB0DE790E}"/>
+                </a:ext>
+              </a:extLst>
+            </p:cNvPr>
+            <p:cNvSpPr txBox="1"/>
+            <p:nvPr/>
+          </p:nvSpPr>
+          <p:spPr>
+            <a:xfrm>
+              <a:off x="6498062" y="3676453"/>
+              <a:ext cx="354263" cy="153888"/>
+            </a:xfrm>
+            <a:prstGeom prst="rect">
+              <a:avLst/>
+            </a:prstGeom>
+            <a:solidFill>
+              <a:sysClr val="window" lastClr="FFFFFF"/>
+            </a:solidFill>
+          </p:spPr>
+          <p:txBody>
+            <a:bodyPr wrap="none" lIns="0" tIns="0" rIns="0" bIns="0" rtlCol="0">
+              <a:spAutoFit/>
+            </a:bodyPr>
+            <a:lstStyle>
+              <a:defPPr>
+                <a:defRPr lang="en-US"/>
+              </a:defPPr>
+              <a:lvl1pPr marR="0" lvl="0" indent="0" algn="ctr" fontAlgn="auto">
+                <a:lnSpc>
+                  <a:spcPct val="100000"/>
+                </a:lnSpc>
+                <a:spcBef>
+                  <a:spcPts val="0"/>
+                </a:spcBef>
+                <a:spcAft>
+                  <a:spcPts val="0"/>
+                </a:spcAft>
+                <a:buClrTx/>
+                <a:buSzTx/>
+                <a:buFontTx/>
+                <a:buNone/>
+                <a:tabLst/>
+                <a:defRPr kumimoji="0" sz="1000" b="0" i="0" u="none" strike="noStrike" kern="0" cap="none" spc="0" normalizeH="0" baseline="0">
+                  <a:ln>
+                    <a:noFill/>
+                  </a:ln>
+                  <a:solidFill>
+                    <a:prstClr val="black"/>
+                  </a:solidFill>
+                  <a:effectLst/>
+                  <a:uLnTx/>
+                  <a:uFillTx/>
+                  <a:latin typeface="Calibri" panose="020F0502020204030204"/>
+                </a:defRPr>
+              </a:lvl1pPr>
+            </a:lstStyle>
+            <a:p>
+              <a:r>
+                <a:rPr lang="en-US" dirty="0"/>
+                <a:t>import</a:t>
+              </a:r>
+            </a:p>
+          </p:txBody>
+        </p:sp>
+        <p:sp>
+          <p:nvSpPr>
+            <p:cNvPr id="19" name="TextBox 18">
+              <a:extLst>
+                <a:ext uri="{FF2B5EF4-FFF2-40B4-BE49-F238E27FC236}">
+                  <a16:creationId xmlns:a16="http://schemas.microsoft.com/office/drawing/2014/main" id="{AABA8348-D57F-285A-C1DC-F0F8E81DB9A2}"/>
+                </a:ext>
+              </a:extLst>
+            </p:cNvPr>
+            <p:cNvSpPr txBox="1"/>
+            <p:nvPr/>
+          </p:nvSpPr>
+          <p:spPr>
+            <a:xfrm>
+              <a:off x="5908428" y="3645096"/>
+              <a:ext cx="354263" cy="153888"/>
+            </a:xfrm>
+            <a:prstGeom prst="rect">
+              <a:avLst/>
+            </a:prstGeom>
+            <a:solidFill>
+              <a:sysClr val="window" lastClr="FFFFFF"/>
+            </a:solidFill>
+          </p:spPr>
+          <p:txBody>
+            <a:bodyPr wrap="none" lIns="0" tIns="0" rIns="0" bIns="0" rtlCol="0">
+              <a:spAutoFit/>
+            </a:bodyPr>
+            <a:lstStyle>
+              <a:defPPr>
+                <a:defRPr lang="en-US"/>
+              </a:defPPr>
+              <a:lvl1pPr marR="0" lvl="0" indent="0" algn="ctr" fontAlgn="auto">
+                <a:lnSpc>
+                  <a:spcPct val="100000"/>
+                </a:lnSpc>
+                <a:spcBef>
+                  <a:spcPts val="0"/>
+                </a:spcBef>
+                <a:spcAft>
+                  <a:spcPts val="0"/>
+                </a:spcAft>
+                <a:buClrTx/>
+                <a:buSzTx/>
+                <a:buFontTx/>
+                <a:buNone/>
+                <a:tabLst/>
+                <a:defRPr kumimoji="0" sz="1000" b="0" i="0" u="none" strike="noStrike" kern="0" cap="none" spc="0" normalizeH="0" baseline="0">
+                  <a:ln>
+                    <a:noFill/>
+                  </a:ln>
+                  <a:solidFill>
+                    <a:prstClr val="black"/>
+                  </a:solidFill>
+                  <a:effectLst/>
+                  <a:uLnTx/>
+                  <a:uFillTx/>
+                  <a:latin typeface="Calibri" panose="020F0502020204030204"/>
+                </a:defRPr>
+              </a:lvl1pPr>
+            </a:lstStyle>
+            <a:p>
+              <a:r>
+                <a:rPr lang="en-US" dirty="0"/>
+                <a:t>import</a:t>
+              </a:r>
+            </a:p>
+          </p:txBody>
+        </p:sp>
+        <p:sp>
+          <p:nvSpPr>
+            <p:cNvPr id="20" name="TextBox 19">
+              <a:extLst>
+                <a:ext uri="{FF2B5EF4-FFF2-40B4-BE49-F238E27FC236}">
+                  <a16:creationId xmlns:a16="http://schemas.microsoft.com/office/drawing/2014/main" id="{9C349EFD-2C17-393D-36F5-A04454845239}"/>
+                </a:ext>
+              </a:extLst>
+            </p:cNvPr>
+            <p:cNvSpPr txBox="1"/>
+            <p:nvPr/>
+          </p:nvSpPr>
+          <p:spPr>
+            <a:xfrm>
+              <a:off x="5485549" y="2679377"/>
+              <a:ext cx="354263" cy="153888"/>
+            </a:xfrm>
+            <a:prstGeom prst="rect">
+              <a:avLst/>
+            </a:prstGeom>
+            <a:solidFill>
+              <a:sysClr val="window" lastClr="FFFFFF"/>
+            </a:solidFill>
+          </p:spPr>
+          <p:txBody>
+            <a:bodyPr wrap="none" lIns="0" tIns="0" rIns="0" bIns="0" rtlCol="0">
+              <a:spAutoFit/>
+            </a:bodyPr>
+            <a:lstStyle>
+              <a:defPPr>
+                <a:defRPr lang="en-US"/>
+              </a:defPPr>
+              <a:lvl1pPr marR="0" lvl="0" indent="0" algn="ctr" fontAlgn="auto">
+                <a:lnSpc>
+                  <a:spcPct val="100000"/>
+                </a:lnSpc>
+                <a:spcBef>
+                  <a:spcPts val="0"/>
+                </a:spcBef>
+                <a:spcAft>
+                  <a:spcPts val="0"/>
+                </a:spcAft>
+                <a:buClrTx/>
+                <a:buSzTx/>
+                <a:buFontTx/>
+                <a:buNone/>
+                <a:tabLst/>
+                <a:defRPr kumimoji="0" sz="1000" b="0" i="0" u="none" strike="noStrike" kern="0" cap="none" spc="0" normalizeH="0" baseline="0">
+                  <a:ln>
+                    <a:noFill/>
+                  </a:ln>
+                  <a:solidFill>
+                    <a:prstClr val="black"/>
+                  </a:solidFill>
+                  <a:effectLst/>
+                  <a:uLnTx/>
+                  <a:uFillTx/>
+                  <a:latin typeface="Calibri" panose="020F0502020204030204"/>
+                </a:defRPr>
+              </a:lvl1pPr>
+            </a:lstStyle>
+            <a:p>
+              <a:r>
+                <a:rPr lang="en-US" dirty="0"/>
+                <a:t>import</a:t>
+              </a:r>
+            </a:p>
+          </p:txBody>
+        </p:sp>
+        <p:sp>
+          <p:nvSpPr>
+            <p:cNvPr id="21" name="TextBox 20">
+              <a:extLst>
+                <a:ext uri="{FF2B5EF4-FFF2-40B4-BE49-F238E27FC236}">
+                  <a16:creationId xmlns:a16="http://schemas.microsoft.com/office/drawing/2014/main" id="{BFE0F2E6-888D-91E4-4BA2-F5E05A89E5C8}"/>
+                </a:ext>
+              </a:extLst>
+            </p:cNvPr>
+            <p:cNvSpPr txBox="1"/>
+            <p:nvPr/>
+          </p:nvSpPr>
+          <p:spPr>
+            <a:xfrm>
+              <a:off x="3600317" y="2751358"/>
+              <a:ext cx="354263" cy="153888"/>
+            </a:xfrm>
+            <a:prstGeom prst="rect">
+              <a:avLst/>
+            </a:prstGeom>
+            <a:solidFill>
+              <a:sysClr val="window" lastClr="FFFFFF"/>
+            </a:solidFill>
+          </p:spPr>
+          <p:txBody>
+            <a:bodyPr wrap="none" lIns="0" tIns="0" rIns="0" bIns="0" rtlCol="0">
+              <a:spAutoFit/>
+            </a:bodyPr>
+            <a:lstStyle/>
+            <a:p>
+              <a:pPr marL="0" marR="0" lvl="0" indent="0" algn="ctr" defTabSz="914400" eaLnBrk="1" fontAlgn="auto" latinLnBrk="0" hangingPunct="1">
+                <a:lnSpc>
+                  <a:spcPct val="100000"/>
+                </a:lnSpc>
+                <a:spcBef>
+                  <a:spcPts val="0"/>
+                </a:spcBef>
+                <a:spcAft>
+                  <a:spcPts val="0"/>
+                </a:spcAft>
+                <a:buClrTx/>
+                <a:buSzTx/>
+                <a:buFontTx/>
+                <a:buNone/>
+                <a:tabLst/>
+                <a:defRPr/>
+              </a:pPr>
+              <a:r>
+                <a:rPr kumimoji="0" lang="en-US" sz="1000" b="0" i="0" u="none" strike="noStrike" kern="0" cap="none" spc="0" normalizeH="0" baseline="0" noProof="0" dirty="0">
+                  <a:ln>
+                    <a:noFill/>
+                  </a:ln>
+                  <a:solidFill>
+                    <a:prstClr val="black"/>
+                  </a:solidFill>
+                  <a:effectLst/>
+                  <a:uLnTx/>
+                  <a:uFillTx/>
+                  <a:latin typeface="Calibri" panose="020F0502020204030204"/>
+                </a:rPr>
+                <a:t>import</a:t>
+              </a:r>
+            </a:p>
+          </p:txBody>
+        </p:sp>
+        <p:grpSp>
+          <p:nvGrpSpPr>
+            <p:cNvPr id="28" name="Group 27">
+              <a:extLst>
+                <a:ext uri="{FF2B5EF4-FFF2-40B4-BE49-F238E27FC236}">
+                  <a16:creationId xmlns:a16="http://schemas.microsoft.com/office/drawing/2014/main" id="{7297161C-FDFB-8372-F9B2-95C4BB04F66C}"/>
+                </a:ext>
+              </a:extLst>
+            </p:cNvPr>
+            <p:cNvGrpSpPr/>
+            <p:nvPr/>
+          </p:nvGrpSpPr>
+          <p:grpSpPr>
+            <a:xfrm>
+              <a:off x="4815978" y="4344993"/>
+              <a:ext cx="1298452" cy="1088462"/>
+              <a:chOff x="5157002" y="4582599"/>
+              <a:chExt cx="1298452" cy="1088462"/>
+            </a:xfrm>
+          </p:grpSpPr>
+          <p:sp>
+            <p:nvSpPr>
+              <p:cNvPr id="4" name="Flowchart: Multidocument 3">
+                <a:extLst>
+                  <a:ext uri="{FF2B5EF4-FFF2-40B4-BE49-F238E27FC236}">
+                    <a16:creationId xmlns:a16="http://schemas.microsoft.com/office/drawing/2014/main" id="{E4BD5CEF-7B3A-F6B9-5350-221ACC3B4D58}"/>
+                  </a:ext>
+                </a:extLst>
+              </p:cNvPr>
+              <p:cNvSpPr/>
+              <p:nvPr/>
+            </p:nvSpPr>
+            <p:spPr>
+              <a:xfrm>
+                <a:off x="5349028" y="4582599"/>
+                <a:ext cx="914400" cy="685800"/>
+              </a:xfrm>
+              <a:prstGeom prst="flowChartMultidocument">
+                <a:avLst/>
+              </a:prstGeom>
+              <a:noFill/>
+              <a:ln w="19050" cap="flat" cmpd="sng" algn="ctr">
+                <a:solidFill>
+                  <a:sysClr val="windowText" lastClr="000000"/>
+                </a:solidFill>
+                <a:prstDash val="solid"/>
+              </a:ln>
+              <a:effectLst/>
+            </p:spPr>
+            <p:txBody>
+              <a:bodyPr tIns="91440" rtlCol="0" anchor="t" anchorCtr="0"/>
+              <a:lstStyle/>
+              <a:p>
+                <a:r>
+                  <a:rPr lang="en-US" sz="1100" kern="0" dirty="0">
+                    <a:solidFill>
+                      <a:prstClr val="black"/>
+                    </a:solidFill>
+                    <a:latin typeface="Calibri" panose="020F0502020204030204"/>
+                  </a:rPr>
+                  <a:t>AWS Profile</a:t>
+                </a:r>
+              </a:p>
+            </p:txBody>
+          </p:sp>
+          <p:sp>
+            <p:nvSpPr>
+              <p:cNvPr id="22" name="TextBox 21">
+                <a:extLst>
+                  <a:ext uri="{FF2B5EF4-FFF2-40B4-BE49-F238E27FC236}">
+                    <a16:creationId xmlns:a16="http://schemas.microsoft.com/office/drawing/2014/main" id="{50FD6490-862D-0A7E-CD7B-B77407D189B7}"/>
+                  </a:ext>
+                </a:extLst>
+              </p:cNvPr>
+              <p:cNvSpPr txBox="1"/>
+              <p:nvPr/>
+            </p:nvSpPr>
+            <p:spPr>
+              <a:xfrm>
+                <a:off x="5157002" y="5270951"/>
+                <a:ext cx="1298452" cy="400110"/>
+              </a:xfrm>
+              <a:prstGeom prst="rect">
+                <a:avLst/>
+              </a:prstGeom>
+              <a:noFill/>
+            </p:spPr>
+            <p:txBody>
+              <a:bodyPr wrap="square" rtlCol="0">
+                <a:spAutoFit/>
+              </a:bodyPr>
+              <a:lstStyle>
+                <a:defPPr>
+                  <a:defRPr lang="en-US"/>
+                </a:defPPr>
+                <a:lvl1pPr algn="ctr">
+                  <a:defRPr sz="1000"/>
+                </a:lvl1pPr>
+              </a:lstStyle>
+              <a:p>
+                <a:r>
+                  <a:rPr lang="en-US" dirty="0"/>
+                  <a:t>Vendor Specific  Definitions</a:t>
+                </a:r>
+              </a:p>
+            </p:txBody>
+          </p:sp>
+        </p:grpSp>
+        <p:grpSp>
+          <p:nvGrpSpPr>
+            <p:cNvPr id="29" name="Group 28">
+              <a:extLst>
+                <a:ext uri="{FF2B5EF4-FFF2-40B4-BE49-F238E27FC236}">
+                  <a16:creationId xmlns:a16="http://schemas.microsoft.com/office/drawing/2014/main" id="{338E28D0-9A97-6A16-8450-167396999F24}"/>
+                </a:ext>
+              </a:extLst>
+            </p:cNvPr>
+            <p:cNvGrpSpPr/>
+            <p:nvPr/>
+          </p:nvGrpSpPr>
+          <p:grpSpPr>
+            <a:xfrm>
+              <a:off x="6243022" y="4344993"/>
+              <a:ext cx="1298452" cy="1102765"/>
+              <a:chOff x="6801099" y="4582599"/>
+              <a:chExt cx="1298452" cy="1102765"/>
+            </a:xfrm>
+          </p:grpSpPr>
+          <p:sp>
+            <p:nvSpPr>
+              <p:cNvPr id="6" name="Flowchart: Multidocument 5">
+                <a:extLst>
+                  <a:ext uri="{FF2B5EF4-FFF2-40B4-BE49-F238E27FC236}">
+                    <a16:creationId xmlns:a16="http://schemas.microsoft.com/office/drawing/2014/main" id="{18398E36-287B-B2FE-6BBA-7799599EA76C}"/>
+                  </a:ext>
+                </a:extLst>
+              </p:cNvPr>
+              <p:cNvSpPr/>
+              <p:nvPr/>
+            </p:nvSpPr>
+            <p:spPr>
+              <a:xfrm>
+                <a:off x="6993125" y="4582599"/>
+                <a:ext cx="914400" cy="685800"/>
+              </a:xfrm>
+              <a:prstGeom prst="flowChartMultidocument">
+                <a:avLst/>
+              </a:prstGeom>
+              <a:noFill/>
+              <a:ln w="19050" cap="flat" cmpd="sng" algn="ctr">
+                <a:solidFill>
+                  <a:sysClr val="windowText" lastClr="000000"/>
+                </a:solidFill>
+                <a:prstDash val="solid"/>
+              </a:ln>
+              <a:effectLst/>
+            </p:spPr>
+            <p:txBody>
+              <a:bodyPr tIns="91440" rIns="0" rtlCol="0" anchor="t" anchorCtr="0"/>
+              <a:lstStyle/>
+              <a:p>
+                <a:r>
+                  <a:rPr lang="en-US" sz="1100" kern="0" dirty="0">
+                    <a:solidFill>
+                      <a:prstClr val="black"/>
+                    </a:solidFill>
+                    <a:latin typeface="Calibri" panose="020F0502020204030204"/>
+                  </a:rPr>
+                  <a:t>OpenStack Profile</a:t>
+                </a:r>
+              </a:p>
+            </p:txBody>
+          </p:sp>
+          <p:sp>
+            <p:nvSpPr>
+              <p:cNvPr id="23" name="TextBox 22">
+                <a:extLst>
+                  <a:ext uri="{FF2B5EF4-FFF2-40B4-BE49-F238E27FC236}">
+                    <a16:creationId xmlns:a16="http://schemas.microsoft.com/office/drawing/2014/main" id="{1F225E2C-6157-3B3B-93BD-E4D4A22F35A8}"/>
+                  </a:ext>
+                </a:extLst>
+              </p:cNvPr>
+              <p:cNvSpPr txBox="1"/>
+              <p:nvPr/>
+            </p:nvSpPr>
+            <p:spPr>
+              <a:xfrm>
+                <a:off x="6801099" y="5285254"/>
+                <a:ext cx="1298452" cy="400110"/>
+              </a:xfrm>
+              <a:prstGeom prst="rect">
+                <a:avLst/>
+              </a:prstGeom>
+              <a:noFill/>
+            </p:spPr>
+            <p:txBody>
+              <a:bodyPr wrap="square" rtlCol="0">
+                <a:spAutoFit/>
+              </a:bodyPr>
+              <a:lstStyle>
+                <a:defPPr>
+                  <a:defRPr lang="en-US"/>
+                </a:defPPr>
+                <a:lvl1pPr algn="ctr">
+                  <a:defRPr sz="1000"/>
+                </a:lvl1pPr>
+              </a:lstStyle>
+              <a:p>
+                <a:r>
+                  <a:rPr lang="en-US" dirty="0"/>
+                  <a:t>Vendor Specific  Definitions</a:t>
+                </a:r>
+              </a:p>
+            </p:txBody>
+          </p:sp>
+        </p:grpSp>
+        <p:sp>
+          <p:nvSpPr>
+            <p:cNvPr id="5" name="Flowchart: Multidocument 4">
+              <a:extLst>
+                <a:ext uri="{FF2B5EF4-FFF2-40B4-BE49-F238E27FC236}">
+                  <a16:creationId xmlns:a16="http://schemas.microsoft.com/office/drawing/2014/main" id="{9ABF8E2D-4F30-107C-C91B-38A8217A03C3}"/>
+                </a:ext>
+              </a:extLst>
+            </p:cNvPr>
+            <p:cNvSpPr/>
+            <p:nvPr/>
+          </p:nvSpPr>
+          <p:spPr>
+            <a:xfrm>
+              <a:off x="7797439" y="4344993"/>
+              <a:ext cx="914400" cy="685800"/>
+            </a:xfrm>
+            <a:prstGeom prst="flowChartMultidocument">
+              <a:avLst/>
+            </a:prstGeom>
+            <a:noFill/>
+            <a:ln w="19050" cap="flat" cmpd="sng" algn="ctr">
+              <a:solidFill>
+                <a:sysClr val="windowText" lastClr="000000"/>
+              </a:solidFill>
+              <a:prstDash val="solid"/>
+            </a:ln>
+            <a:effectLst/>
+          </p:spPr>
+          <p:txBody>
+            <a:bodyPr tIns="91440" rIns="0" rtlCol="0" anchor="t" anchorCtr="0"/>
+            <a:lstStyle/>
+            <a:p>
+              <a:r>
+                <a:rPr lang="en-US" sz="1100" kern="0" dirty="0">
+                  <a:solidFill>
+                    <a:prstClr val="black"/>
+                  </a:solidFill>
+                  <a:latin typeface="Calibri" panose="020F0502020204030204"/>
+                </a:rPr>
+                <a:t>Proxmox Profile</a:t>
+              </a:r>
+            </a:p>
+          </p:txBody>
+        </p:sp>
+        <p:sp>
+          <p:nvSpPr>
+            <p:cNvPr id="24" name="TextBox 23">
+              <a:extLst>
+                <a:ext uri="{FF2B5EF4-FFF2-40B4-BE49-F238E27FC236}">
+                  <a16:creationId xmlns:a16="http://schemas.microsoft.com/office/drawing/2014/main" id="{CB76762B-DE56-28B3-919B-D1AC20FD745B}"/>
+                </a:ext>
+              </a:extLst>
+            </p:cNvPr>
+            <p:cNvSpPr txBox="1"/>
+            <p:nvPr/>
+          </p:nvSpPr>
+          <p:spPr>
+            <a:xfrm>
+              <a:off x="7605413" y="5047648"/>
+              <a:ext cx="1298452" cy="400110"/>
+            </a:xfrm>
+            <a:prstGeom prst="rect">
+              <a:avLst/>
+            </a:prstGeom>
+            <a:noFill/>
+          </p:spPr>
+          <p:txBody>
+            <a:bodyPr wrap="square" rtlCol="0">
+              <a:spAutoFit/>
+            </a:bodyPr>
+            <a:lstStyle>
+              <a:defPPr>
+                <a:defRPr lang="en-US"/>
+              </a:defPPr>
+              <a:lvl1pPr algn="ctr">
+                <a:defRPr sz="1000"/>
+              </a:lvl1pPr>
+            </a:lstStyle>
+            <a:p>
+              <a:r>
+                <a:rPr lang="en-US" dirty="0"/>
+                <a:t>Vendor Specific  Definitions</a:t>
+              </a:r>
+            </a:p>
+          </p:txBody>
+        </p:sp>
+        <p:sp>
+          <p:nvSpPr>
+            <p:cNvPr id="42" name="TextBox 41">
+              <a:extLst>
+                <a:ext uri="{FF2B5EF4-FFF2-40B4-BE49-F238E27FC236}">
+                  <a16:creationId xmlns:a16="http://schemas.microsoft.com/office/drawing/2014/main" id="{1477B4B9-C7CA-621D-C0CB-2E3F9BDCDF8E}"/>
+                </a:ext>
+              </a:extLst>
+            </p:cNvPr>
+            <p:cNvSpPr txBox="1"/>
+            <p:nvPr/>
+          </p:nvSpPr>
+          <p:spPr>
+            <a:xfrm>
+              <a:off x="7115097" y="3653524"/>
+              <a:ext cx="354263" cy="153888"/>
+            </a:xfrm>
+            <a:prstGeom prst="rect">
+              <a:avLst/>
+            </a:prstGeom>
+            <a:solidFill>
+              <a:sysClr val="window" lastClr="FFFFFF"/>
+            </a:solidFill>
+          </p:spPr>
+          <p:txBody>
+            <a:bodyPr wrap="none" lIns="0" tIns="0" rIns="0" bIns="0" rtlCol="0">
+              <a:spAutoFit/>
+            </a:bodyPr>
+            <a:lstStyle>
+              <a:defPPr>
+                <a:defRPr lang="en-US"/>
+              </a:defPPr>
+              <a:lvl1pPr marR="0" lvl="0" indent="0" algn="ctr" fontAlgn="auto">
+                <a:lnSpc>
+                  <a:spcPct val="100000"/>
+                </a:lnSpc>
+                <a:spcBef>
+                  <a:spcPts val="0"/>
+                </a:spcBef>
+                <a:spcAft>
+                  <a:spcPts val="0"/>
+                </a:spcAft>
+                <a:buClrTx/>
+                <a:buSzTx/>
+                <a:buFontTx/>
+                <a:buNone/>
+                <a:tabLst/>
+                <a:defRPr kumimoji="0" sz="1000" b="0" i="0" u="none" strike="noStrike" kern="0" cap="none" spc="0" normalizeH="0" baseline="0">
+                  <a:ln>
+                    <a:noFill/>
+                  </a:ln>
+                  <a:solidFill>
+                    <a:prstClr val="black"/>
+                  </a:solidFill>
+                  <a:effectLst/>
+                  <a:uLnTx/>
+                  <a:uFillTx/>
+                  <a:latin typeface="Calibri" panose="020F0502020204030204"/>
+                </a:defRPr>
+              </a:lvl1pPr>
+            </a:lstStyle>
+            <a:p>
+              <a:r>
+                <a:rPr lang="en-US" dirty="0"/>
+                <a:t>import</a:t>
+              </a:r>
+            </a:p>
+          </p:txBody>
+        </p:sp>
+      </p:grpSp>
+    </p:spTree>
+    <p:extLst>
+      <p:ext uri="{BB962C8B-B14F-4D97-AF65-F5344CB8AC3E}">
+        <p14:creationId xmlns:p14="http://schemas.microsoft.com/office/powerpoint/2010/main" val="3174812243"/>
+      </p:ext>
+    </p:extLst>
+  </p:cSld>
+  <p:clrMapOvr>
+    <a:masterClrMapping/>
+  </p:clrMapOvr>
+</p:sld>
+</file>
+
 <file path=ppt/theme/theme1.xml><?xml version="1.0" encoding="utf-8"?>
 <a:theme xmlns:a="http://schemas.openxmlformats.org/drawingml/2006/main" name="Office Theme">
   <a:themeElements>

</xml_diff>

<commit_message>
Add to the documentation of the use of abstraction in the Ubicity profiles (#222)
* Add files via upload

* Additional documentation for the use of Abstraction in the Ubicity profiles.

* Add files via upload

* Add files via upload

* Update images
</commit_message>
<xml_diff>
--- a/profiles/com/ubicity/sources/figures.pptx
+++ b/profiles/com/ubicity/sources/figures.pptx
@@ -5,17 +5,18 @@
     <p:sldMasterId id="2147483648" r:id="rId1"/>
   </p:sldMasterIdLst>
   <p:notesMasterIdLst>
-    <p:notesMasterId r:id="rId10"/>
+    <p:notesMasterId r:id="rId11"/>
   </p:notesMasterIdLst>
   <p:sldIdLst>
-    <p:sldId id="265" r:id="rId2"/>
-    <p:sldId id="256" r:id="rId3"/>
+    <p:sldId id="267" r:id="rId2"/>
+    <p:sldId id="265" r:id="rId3"/>
     <p:sldId id="260" r:id="rId4"/>
     <p:sldId id="259" r:id="rId5"/>
     <p:sldId id="263" r:id="rId6"/>
-    <p:sldId id="261" r:id="rId7"/>
-    <p:sldId id="264" r:id="rId8"/>
-    <p:sldId id="266" r:id="rId9"/>
+    <p:sldId id="268" r:id="rId7"/>
+    <p:sldId id="261" r:id="rId8"/>
+    <p:sldId id="264" r:id="rId9"/>
+    <p:sldId id="266" r:id="rId10"/>
   </p:sldIdLst>
   <p:sldSz cx="12192000" cy="6858000"/>
   <p:notesSz cx="6858000" cy="9144000"/>
@@ -204,7 +205,7 @@
           <a:p>
             <a:fld id="{9BC9C640-FDAB-4920-985D-AE6877D6D812}" type="datetimeFigureOut">
               <a:rPr lang="en-US" smtClean="0"/>
-              <a:t>7/21/2025</a:t>
+              <a:t>9/12/2025</a:t>
             </a:fld>
             <a:endParaRPr lang="en-US"/>
           </a:p>
@@ -618,7 +619,7 @@
           <a:p>
             <a:fld id="{7588158F-7D22-4D02-A7C1-554F35EEE72C}" type="datetimeFigureOut">
               <a:rPr lang="en-US" smtClean="0"/>
-              <a:t>7/21/2025</a:t>
+              <a:t>9/12/2025</a:t>
             </a:fld>
             <a:endParaRPr lang="en-US"/>
           </a:p>
@@ -816,7 +817,7 @@
           <a:p>
             <a:fld id="{7588158F-7D22-4D02-A7C1-554F35EEE72C}" type="datetimeFigureOut">
               <a:rPr lang="en-US" smtClean="0"/>
-              <a:t>7/21/2025</a:t>
+              <a:t>9/12/2025</a:t>
             </a:fld>
             <a:endParaRPr lang="en-US"/>
           </a:p>
@@ -1024,7 +1025,7 @@
           <a:p>
             <a:fld id="{7588158F-7D22-4D02-A7C1-554F35EEE72C}" type="datetimeFigureOut">
               <a:rPr lang="en-US" smtClean="0"/>
-              <a:t>7/21/2025</a:t>
+              <a:t>9/12/2025</a:t>
             </a:fld>
             <a:endParaRPr lang="en-US"/>
           </a:p>
@@ -1222,7 +1223,7 @@
           <a:p>
             <a:fld id="{7588158F-7D22-4D02-A7C1-554F35EEE72C}" type="datetimeFigureOut">
               <a:rPr lang="en-US" smtClean="0"/>
-              <a:t>7/21/2025</a:t>
+              <a:t>9/12/2025</a:t>
             </a:fld>
             <a:endParaRPr lang="en-US"/>
           </a:p>
@@ -1497,7 +1498,7 @@
           <a:p>
             <a:fld id="{7588158F-7D22-4D02-A7C1-554F35EEE72C}" type="datetimeFigureOut">
               <a:rPr lang="en-US" smtClean="0"/>
-              <a:t>7/21/2025</a:t>
+              <a:t>9/12/2025</a:t>
             </a:fld>
             <a:endParaRPr lang="en-US"/>
           </a:p>
@@ -1762,7 +1763,7 @@
           <a:p>
             <a:fld id="{7588158F-7D22-4D02-A7C1-554F35EEE72C}" type="datetimeFigureOut">
               <a:rPr lang="en-US" smtClean="0"/>
-              <a:t>7/21/2025</a:t>
+              <a:t>9/12/2025</a:t>
             </a:fld>
             <a:endParaRPr lang="en-US"/>
           </a:p>
@@ -2174,7 +2175,7 @@
           <a:p>
             <a:fld id="{7588158F-7D22-4D02-A7C1-554F35EEE72C}" type="datetimeFigureOut">
               <a:rPr lang="en-US" smtClean="0"/>
-              <a:t>7/21/2025</a:t>
+              <a:t>9/12/2025</a:t>
             </a:fld>
             <a:endParaRPr lang="en-US"/>
           </a:p>
@@ -2315,7 +2316,7 @@
           <a:p>
             <a:fld id="{7588158F-7D22-4D02-A7C1-554F35EEE72C}" type="datetimeFigureOut">
               <a:rPr lang="en-US" smtClean="0"/>
-              <a:t>7/21/2025</a:t>
+              <a:t>9/12/2025</a:t>
             </a:fld>
             <a:endParaRPr lang="en-US"/>
           </a:p>
@@ -2428,7 +2429,7 @@
           <a:p>
             <a:fld id="{7588158F-7D22-4D02-A7C1-554F35EEE72C}" type="datetimeFigureOut">
               <a:rPr lang="en-US" smtClean="0"/>
-              <a:t>7/21/2025</a:t>
+              <a:t>9/12/2025</a:t>
             </a:fld>
             <a:endParaRPr lang="en-US"/>
           </a:p>
@@ -2739,7 +2740,7 @@
           <a:p>
             <a:fld id="{7588158F-7D22-4D02-A7C1-554F35EEE72C}" type="datetimeFigureOut">
               <a:rPr lang="en-US" smtClean="0"/>
-              <a:t>7/21/2025</a:t>
+              <a:t>9/12/2025</a:t>
             </a:fld>
             <a:endParaRPr lang="en-US"/>
           </a:p>
@@ -3027,7 +3028,7 @@
           <a:p>
             <a:fld id="{7588158F-7D22-4D02-A7C1-554F35EEE72C}" type="datetimeFigureOut">
               <a:rPr lang="en-US" smtClean="0"/>
-              <a:t>7/21/2025</a:t>
+              <a:t>9/12/2025</a:t>
             </a:fld>
             <a:endParaRPr lang="en-US"/>
           </a:p>
@@ -3268,7 +3269,7 @@
           <a:p>
             <a:fld id="{7588158F-7D22-4D02-A7C1-554F35EEE72C}" type="datetimeFigureOut">
               <a:rPr lang="en-US" smtClean="0"/>
-              <a:t>7/21/2025</a:t>
+              <a:t>9/12/2025</a:t>
             </a:fld>
             <a:endParaRPr lang="en-US"/>
           </a:p>
@@ -4454,7 +4455,7 @@
     </p:spTree>
     <p:extLst>
       <p:ext uri="{BB962C8B-B14F-4D97-AF65-F5344CB8AC3E}">
-        <p14:creationId xmlns:p14="http://schemas.microsoft.com/office/powerpoint/2010/main" val="3114086980"/>
+        <p14:creationId xmlns:p14="http://schemas.microsoft.com/office/powerpoint/2010/main" val="146338081"/>
       </p:ext>
     </p:extLst>
   </p:cSld>
@@ -4498,6 +4499,38 @@
         <p:spPr>
           <a:xfrm>
             <a:off x="3331722" y="3760285"/>
+            <a:ext cx="5059361" cy="0"/>
+          </a:xfrm>
+          <a:prstGeom prst="line">
+            <a:avLst/>
+          </a:prstGeom>
+          <a:noFill/>
+          <a:ln w="28575" cap="flat" cmpd="sng" algn="ctr">
+            <a:solidFill>
+              <a:srgbClr val="7030A0"/>
+            </a:solidFill>
+            <a:prstDash val="dash"/>
+          </a:ln>
+          <a:effectLst/>
+        </p:spPr>
+      </p:cxnSp>
+      <p:cxnSp>
+        <p:nvCxnSpPr>
+          <p:cNvPr id="5" name="Straight Connector 4">
+            <a:extLst>
+              <a:ext uri="{FF2B5EF4-FFF2-40B4-BE49-F238E27FC236}">
+                <a16:creationId xmlns:a16="http://schemas.microsoft.com/office/drawing/2014/main" id="{F4179A0B-2ED5-5342-D11F-DAB511F1284C}"/>
+              </a:ext>
+            </a:extLst>
+          </p:cNvPr>
+          <p:cNvCxnSpPr>
+            <a:cxnSpLocks/>
+          </p:cNvCxnSpPr>
+          <p:nvPr/>
+        </p:nvCxnSpPr>
+        <p:spPr>
+          <a:xfrm>
+            <a:off x="3322456" y="4422853"/>
             <a:ext cx="5059361" cy="0"/>
           </a:xfrm>
           <a:prstGeom prst="line">
@@ -4917,10 +4950,135 @@
           </a:p>
         </p:txBody>
       </p:sp>
+      <p:sp>
+        <p:nvSpPr>
+          <p:cNvPr id="8" name="TextBox 7">
+            <a:extLst>
+              <a:ext uri="{FF2B5EF4-FFF2-40B4-BE49-F238E27FC236}">
+                <a16:creationId xmlns:a16="http://schemas.microsoft.com/office/drawing/2014/main" id="{E1B9CA76-A5E7-C8A2-2A61-4EF35CDE76F7}"/>
+              </a:ext>
+            </a:extLst>
+          </p:cNvPr>
+          <p:cNvSpPr txBox="1"/>
+          <p:nvPr/>
+        </p:nvSpPr>
+        <p:spPr>
+          <a:xfrm>
+            <a:off x="3321832" y="4615637"/>
+            <a:ext cx="970779" cy="261610"/>
+          </a:xfrm>
+          <a:prstGeom prst="rect">
+            <a:avLst/>
+          </a:prstGeom>
+          <a:noFill/>
+          <a:ln>
+            <a:noFill/>
+          </a:ln>
+        </p:spPr>
+        <p:txBody>
+          <a:bodyPr wrap="none" lIns="0" rtlCol="0">
+            <a:spAutoFit/>
+          </a:bodyPr>
+          <a:lstStyle>
+            <a:defPPr>
+              <a:defRPr lang="en-US"/>
+            </a:defPPr>
+            <a:lvl1pPr>
+              <a:defRPr sz="1200">
+                <a:solidFill>
+                  <a:prstClr val="black"/>
+                </a:solidFill>
+                <a:latin typeface="Arial"/>
+              </a:defRPr>
+            </a:lvl1pPr>
+          </a:lstStyle>
+          <a:p>
+            <a:r>
+              <a:rPr lang="en-US" sz="1100" dirty="0"/>
+              <a:t>Instance View</a:t>
+            </a:r>
+          </a:p>
+        </p:txBody>
+      </p:sp>
+      <p:sp>
+        <p:nvSpPr>
+          <p:cNvPr id="17" name="Rectangle 16">
+            <a:extLst>
+              <a:ext uri="{FF2B5EF4-FFF2-40B4-BE49-F238E27FC236}">
+                <a16:creationId xmlns:a16="http://schemas.microsoft.com/office/drawing/2014/main" id="{B318050C-0688-082C-DDB1-AC7A8B5B54E6}"/>
+              </a:ext>
+            </a:extLst>
+          </p:cNvPr>
+          <p:cNvSpPr/>
+          <p:nvPr/>
+        </p:nvSpPr>
+        <p:spPr>
+          <a:xfrm>
+            <a:off x="4625128" y="4571256"/>
+            <a:ext cx="3787432" cy="365760"/>
+          </a:xfrm>
+          <a:prstGeom prst="rect">
+            <a:avLst/>
+          </a:prstGeom>
+          <a:solidFill>
+            <a:srgbClr val="8064A2">
+              <a:lumMod val="20000"/>
+              <a:lumOff val="80000"/>
+            </a:srgbClr>
+          </a:solidFill>
+          <a:ln w="9525" cap="flat" cmpd="sng" algn="ctr">
+            <a:solidFill>
+              <a:srgbClr val="7030A0"/>
+            </a:solidFill>
+            <a:prstDash val="solid"/>
+          </a:ln>
+          <a:effectLst/>
+        </p:spPr>
+        <p:txBody>
+          <a:bodyPr rtlCol="0" anchor="ctr"/>
+          <a:lstStyle/>
+          <a:p>
+            <a:pPr marL="0" marR="0" lvl="0" indent="0" algn="ctr" defTabSz="914400" eaLnBrk="1" fontAlgn="auto" latinLnBrk="0" hangingPunct="1">
+              <a:lnSpc>
+                <a:spcPct val="100000"/>
+              </a:lnSpc>
+              <a:spcBef>
+                <a:spcPts val="0"/>
+              </a:spcBef>
+              <a:spcAft>
+                <a:spcPts val="0"/>
+              </a:spcAft>
+              <a:buClrTx/>
+              <a:buSzTx/>
+              <a:buFontTx/>
+              <a:buNone/>
+              <a:tabLst/>
+              <a:defRPr/>
+            </a:pPr>
+            <a:r>
+              <a:rPr kumimoji="0" lang="en-US" sz="1100" b="0" i="0" u="none" strike="noStrike" kern="0" cap="none" spc="0" normalizeH="0" baseline="0" noProof="0" dirty="0">
+                <a:ln>
+                  <a:noFill/>
+                </a:ln>
+                <a:solidFill>
+                  <a:prstClr val="black"/>
+                </a:solidFill>
+                <a:effectLst/>
+                <a:uLnTx/>
+                <a:uFillTx/>
+                <a:latin typeface="Arial"/>
+                <a:ea typeface="+mn-ea"/>
+                <a:cs typeface="+mn-cs"/>
+              </a:rPr>
+              <a:t>Device Specific MIBs, PIBs, CLI, etc. Implementation</a:t>
+            </a:r>
+          </a:p>
+        </p:txBody>
+      </p:sp>
     </p:spTree>
     <p:extLst>
       <p:ext uri="{BB962C8B-B14F-4D97-AF65-F5344CB8AC3E}">
-        <p14:creationId xmlns:p14="http://schemas.microsoft.com/office/powerpoint/2010/main" val="1646575522"/>
+        <p14:creationId xmlns:p14="http://schemas.microsoft.com/office/powerpoint/2010/main" val="3114086980"/>
       </p:ext>
     </p:extLst>
   </p:cSld>
@@ -7916,6 +8074,114 @@
           <a:effectLst/>
         </p:spPr>
       </p:cxnSp>
+      <p:sp>
+        <p:nvSpPr>
+          <p:cNvPr id="2" name="Rectangle 1">
+            <a:extLst>
+              <a:ext uri="{FF2B5EF4-FFF2-40B4-BE49-F238E27FC236}">
+                <a16:creationId xmlns:a16="http://schemas.microsoft.com/office/drawing/2014/main" id="{EA9CF1B3-A785-43CF-CC20-B86EEC470F65}"/>
+              </a:ext>
+            </a:extLst>
+          </p:cNvPr>
+          <p:cNvSpPr/>
+          <p:nvPr/>
+        </p:nvSpPr>
+        <p:spPr>
+          <a:xfrm>
+            <a:off x="6413241" y="4571257"/>
+            <a:ext cx="1643423" cy="365760"/>
+          </a:xfrm>
+          <a:prstGeom prst="rect">
+            <a:avLst/>
+          </a:prstGeom>
+          <a:solidFill>
+            <a:srgbClr val="8064A2">
+              <a:lumMod val="20000"/>
+              <a:lumOff val="80000"/>
+              <a:alpha val="20000"/>
+            </a:srgbClr>
+          </a:solidFill>
+          <a:ln w="3175" cap="flat" cmpd="sng" algn="ctr">
+            <a:solidFill>
+              <a:srgbClr val="7030A0"/>
+            </a:solidFill>
+            <a:prstDash val="solid"/>
+          </a:ln>
+          <a:effectLst/>
+        </p:spPr>
+        <p:txBody>
+          <a:bodyPr rtlCol="0" anchor="ctr"/>
+          <a:lstStyle/>
+          <a:p>
+            <a:pPr marL="0" marR="0" lvl="0" indent="0" algn="ctr" defTabSz="914400" eaLnBrk="1" fontAlgn="auto" latinLnBrk="0" hangingPunct="1">
+              <a:lnSpc>
+                <a:spcPct val="100000"/>
+              </a:lnSpc>
+              <a:spcBef>
+                <a:spcPts val="0"/>
+              </a:spcBef>
+              <a:spcAft>
+                <a:spcPts val="0"/>
+              </a:spcAft>
+              <a:buClrTx/>
+              <a:buSzTx/>
+              <a:buFontTx/>
+              <a:buNone/>
+              <a:tabLst/>
+              <a:defRPr/>
+            </a:pPr>
+            <a:r>
+              <a:rPr kumimoji="0" lang="en-US" sz="1100" b="0" i="0" u="none" strike="noStrike" kern="0" cap="none" spc="0" normalizeH="0" baseline="0" noProof="0" dirty="0">
+                <a:ln>
+                  <a:noFill/>
+                </a:ln>
+                <a:solidFill>
+                  <a:prstClr val="black"/>
+                </a:solidFill>
+                <a:effectLst/>
+                <a:uLnTx/>
+                <a:uFillTx/>
+                <a:latin typeface="Arial"/>
+                <a:ea typeface="+mn-ea"/>
+                <a:cs typeface="+mn-cs"/>
+              </a:rPr>
+              <a:t>Instance View</a:t>
+            </a:r>
+          </a:p>
+        </p:txBody>
+      </p:sp>
+      <p:cxnSp>
+        <p:nvCxnSpPr>
+          <p:cNvPr id="3" name="Straight Connector 2">
+            <a:extLst>
+              <a:ext uri="{FF2B5EF4-FFF2-40B4-BE49-F238E27FC236}">
+                <a16:creationId xmlns:a16="http://schemas.microsoft.com/office/drawing/2014/main" id="{93B667FD-0D5C-7807-17D2-F6AE27EA603E}"/>
+              </a:ext>
+            </a:extLst>
+          </p:cNvPr>
+          <p:cNvCxnSpPr>
+            <a:cxnSpLocks/>
+          </p:cNvCxnSpPr>
+          <p:nvPr/>
+        </p:nvCxnSpPr>
+        <p:spPr>
+          <a:xfrm>
+            <a:off x="6413241" y="4424749"/>
+            <a:ext cx="1643423" cy="0"/>
+          </a:xfrm>
+          <a:prstGeom prst="line">
+            <a:avLst/>
+          </a:prstGeom>
+          <a:noFill/>
+          <a:ln w="28575" cap="flat" cmpd="sng" algn="ctr">
+            <a:solidFill>
+              <a:srgbClr val="7030A0"/>
+            </a:solidFill>
+            <a:prstDash val="dash"/>
+          </a:ln>
+          <a:effectLst/>
+        </p:spPr>
+      </p:cxnSp>
     </p:spTree>
     <p:extLst>
       <p:ext uri="{BB962C8B-B14F-4D97-AF65-F5344CB8AC3E}">
@@ -9006,6 +9272,1563 @@
           </a:p>
         </p:txBody>
       </p:sp>
+      <p:sp>
+        <p:nvSpPr>
+          <p:cNvPr id="2" name="Rectangle 1">
+            <a:extLst>
+              <a:ext uri="{FF2B5EF4-FFF2-40B4-BE49-F238E27FC236}">
+                <a16:creationId xmlns:a16="http://schemas.microsoft.com/office/drawing/2014/main" id="{0B0AA200-486F-F2CB-B1B0-87E1901C28B0}"/>
+              </a:ext>
+            </a:extLst>
+          </p:cNvPr>
+          <p:cNvSpPr/>
+          <p:nvPr/>
+        </p:nvSpPr>
+        <p:spPr>
+          <a:xfrm>
+            <a:off x="6313310" y="4571257"/>
+            <a:ext cx="1643423" cy="365760"/>
+          </a:xfrm>
+          <a:prstGeom prst="rect">
+            <a:avLst/>
+          </a:prstGeom>
+          <a:solidFill>
+            <a:srgbClr val="8064A2">
+              <a:lumMod val="20000"/>
+              <a:lumOff val="80000"/>
+              <a:alpha val="20000"/>
+            </a:srgbClr>
+          </a:solidFill>
+          <a:ln w="3175" cap="flat" cmpd="sng" algn="ctr">
+            <a:solidFill>
+              <a:srgbClr val="7030A0"/>
+            </a:solidFill>
+            <a:prstDash val="solid"/>
+          </a:ln>
+          <a:effectLst/>
+        </p:spPr>
+        <p:txBody>
+          <a:bodyPr rtlCol="0" anchor="ctr"/>
+          <a:lstStyle/>
+          <a:p>
+            <a:pPr marL="0" marR="0" lvl="0" indent="0" algn="ctr" defTabSz="914400" eaLnBrk="1" fontAlgn="auto" latinLnBrk="0" hangingPunct="1">
+              <a:lnSpc>
+                <a:spcPct val="100000"/>
+              </a:lnSpc>
+              <a:spcBef>
+                <a:spcPts val="0"/>
+              </a:spcBef>
+              <a:spcAft>
+                <a:spcPts val="0"/>
+              </a:spcAft>
+              <a:buClrTx/>
+              <a:buSzTx/>
+              <a:buFontTx/>
+              <a:buNone/>
+              <a:tabLst/>
+              <a:defRPr/>
+            </a:pPr>
+            <a:r>
+              <a:rPr kumimoji="0" lang="en-US" sz="1100" b="0" i="0" u="none" strike="noStrike" kern="0" cap="none" spc="0" normalizeH="0" baseline="0" noProof="0" dirty="0">
+                <a:ln>
+                  <a:noFill/>
+                </a:ln>
+                <a:solidFill>
+                  <a:prstClr val="black"/>
+                </a:solidFill>
+                <a:effectLst/>
+                <a:uLnTx/>
+                <a:uFillTx/>
+                <a:latin typeface="Arial"/>
+                <a:ea typeface="+mn-ea"/>
+                <a:cs typeface="+mn-cs"/>
+              </a:rPr>
+              <a:t>Instance View</a:t>
+            </a:r>
+          </a:p>
+        </p:txBody>
+      </p:sp>
+      <p:cxnSp>
+        <p:nvCxnSpPr>
+          <p:cNvPr id="6" name="Straight Connector 5">
+            <a:extLst>
+              <a:ext uri="{FF2B5EF4-FFF2-40B4-BE49-F238E27FC236}">
+                <a16:creationId xmlns:a16="http://schemas.microsoft.com/office/drawing/2014/main" id="{8D362E1E-440C-98A5-90F0-06C24BE050F4}"/>
+              </a:ext>
+            </a:extLst>
+          </p:cNvPr>
+          <p:cNvCxnSpPr>
+            <a:cxnSpLocks/>
+          </p:cNvCxnSpPr>
+          <p:nvPr/>
+        </p:nvCxnSpPr>
+        <p:spPr>
+          <a:xfrm>
+            <a:off x="6313310" y="4424749"/>
+            <a:ext cx="1643423" cy="0"/>
+          </a:xfrm>
+          <a:prstGeom prst="line">
+            <a:avLst/>
+          </a:prstGeom>
+          <a:noFill/>
+          <a:ln w="28575" cap="flat" cmpd="sng" algn="ctr">
+            <a:solidFill>
+              <a:srgbClr val="7030A0"/>
+            </a:solidFill>
+            <a:prstDash val="dash"/>
+          </a:ln>
+          <a:effectLst/>
+        </p:spPr>
+      </p:cxnSp>
+    </p:spTree>
+    <p:extLst>
+      <p:ext uri="{BB962C8B-B14F-4D97-AF65-F5344CB8AC3E}">
+        <p14:creationId xmlns:p14="http://schemas.microsoft.com/office/powerpoint/2010/main" val="4145374575"/>
+      </p:ext>
+    </p:extLst>
+  </p:cSld>
+  <p:clrMapOvr>
+    <a:masterClrMapping/>
+  </p:clrMapOvr>
+</p:sld>
+</file>
+
+<file path=ppt/slides/slide7.xml><?xml version="1.0" encoding="utf-8"?>
+<p:sld xmlns:a="http://schemas.openxmlformats.org/drawingml/2006/main" xmlns:r="http://schemas.openxmlformats.org/officeDocument/2006/relationships" xmlns:p="http://schemas.openxmlformats.org/presentationml/2006/main">
+  <p:cSld>
+    <p:spTree>
+      <p:nvGrpSpPr>
+        <p:cNvPr id="1" name=""/>
+        <p:cNvGrpSpPr/>
+        <p:nvPr/>
+      </p:nvGrpSpPr>
+      <p:grpSpPr>
+        <a:xfrm>
+          <a:off x="0" y="0"/>
+          <a:ext cx="0" cy="0"/>
+          <a:chOff x="0" y="0"/>
+          <a:chExt cx="0" cy="0"/>
+        </a:xfrm>
+      </p:grpSpPr>
+      <p:sp>
+        <p:nvSpPr>
+          <p:cNvPr id="3" name="Web Server Tier">
+            <a:extLst>
+              <a:ext uri="{FF2B5EF4-FFF2-40B4-BE49-F238E27FC236}">
+                <a16:creationId xmlns:a16="http://schemas.microsoft.com/office/drawing/2014/main" id="{C1652037-C836-8518-B00F-68B63C216ED9}"/>
+              </a:ext>
+            </a:extLst>
+          </p:cNvPr>
+          <p:cNvSpPr>
+            <a:spLocks noChangeArrowheads="1"/>
+          </p:cNvSpPr>
+          <p:nvPr/>
+        </p:nvSpPr>
+        <p:spPr bwMode="auto">
+          <a:xfrm>
+            <a:off x="4247386" y="3922501"/>
+            <a:ext cx="603504" cy="365760"/>
+          </a:xfrm>
+          <a:prstGeom prst="roundRect">
+            <a:avLst>
+              <a:gd name="adj" fmla="val 16667"/>
+            </a:avLst>
+          </a:prstGeom>
+          <a:gradFill rotWithShape="1">
+            <a:gsLst>
+              <a:gs pos="0">
+                <a:srgbClr val="8064A2">
+                  <a:tint val="50000"/>
+                  <a:satMod val="300000"/>
+                </a:srgbClr>
+              </a:gs>
+              <a:gs pos="35000">
+                <a:srgbClr val="8064A2">
+                  <a:tint val="37000"/>
+                  <a:satMod val="300000"/>
+                </a:srgbClr>
+              </a:gs>
+              <a:gs pos="100000">
+                <a:srgbClr val="8064A2">
+                  <a:tint val="15000"/>
+                  <a:satMod val="350000"/>
+                </a:srgbClr>
+              </a:gs>
+            </a:gsLst>
+            <a:lin ang="16200000" scaled="1"/>
+          </a:gradFill>
+          <a:ln w="3175" cap="flat" cmpd="sng" algn="ctr">
+            <a:solidFill>
+              <a:srgbClr val="8064A2">
+                <a:shade val="95000"/>
+                <a:satMod val="105000"/>
+              </a:srgbClr>
+            </a:solidFill>
+            <a:prstDash val="solid"/>
+            <a:headEnd/>
+            <a:tailEnd/>
+          </a:ln>
+          <a:effectLst>
+            <a:outerShdw blurRad="40000" dist="20000" dir="5400000" rotWithShape="0">
+              <a:srgbClr val="000000">
+                <a:alpha val="38000"/>
+              </a:srgbClr>
+            </a:outerShdw>
+          </a:effectLst>
+        </p:spPr>
+        <p:txBody>
+          <a:bodyPr lIns="0" tIns="0" rIns="0" bIns="0" anchor="ctr" anchorCtr="0"/>
+          <a:lstStyle>
+            <a:lvl1pPr>
+              <a:defRPr>
+                <a:solidFill>
+                  <a:schemeClr val="tx1"/>
+                </a:solidFill>
+                <a:latin typeface="Calibri" pitchFamily="34" charset="0"/>
+              </a:defRPr>
+            </a:lvl1pPr>
+            <a:lvl2pPr marL="742950" indent="-285750">
+              <a:defRPr>
+                <a:solidFill>
+                  <a:schemeClr val="tx1"/>
+                </a:solidFill>
+                <a:latin typeface="Calibri" pitchFamily="34" charset="0"/>
+              </a:defRPr>
+            </a:lvl2pPr>
+            <a:lvl3pPr marL="1143000" indent="-228600">
+              <a:defRPr>
+                <a:solidFill>
+                  <a:schemeClr val="tx1"/>
+                </a:solidFill>
+                <a:latin typeface="Calibri" pitchFamily="34" charset="0"/>
+              </a:defRPr>
+            </a:lvl3pPr>
+            <a:lvl4pPr marL="1600200" indent="-228600">
+              <a:defRPr>
+                <a:solidFill>
+                  <a:schemeClr val="tx1"/>
+                </a:solidFill>
+                <a:latin typeface="Calibri" pitchFamily="34" charset="0"/>
+              </a:defRPr>
+            </a:lvl4pPr>
+            <a:lvl5pPr marL="2057400" indent="-228600">
+              <a:defRPr>
+                <a:solidFill>
+                  <a:schemeClr val="tx1"/>
+                </a:solidFill>
+                <a:latin typeface="Calibri" pitchFamily="34" charset="0"/>
+              </a:defRPr>
+            </a:lvl5pPr>
+            <a:lvl6pPr marL="2514600" indent="-228600" fontAlgn="base">
+              <a:spcBef>
+                <a:spcPct val="0"/>
+              </a:spcBef>
+              <a:spcAft>
+                <a:spcPct val="0"/>
+              </a:spcAft>
+              <a:defRPr>
+                <a:solidFill>
+                  <a:schemeClr val="tx1"/>
+                </a:solidFill>
+                <a:latin typeface="Calibri" pitchFamily="34" charset="0"/>
+              </a:defRPr>
+            </a:lvl6pPr>
+            <a:lvl7pPr marL="2971800" indent="-228600" fontAlgn="base">
+              <a:spcBef>
+                <a:spcPct val="0"/>
+              </a:spcBef>
+              <a:spcAft>
+                <a:spcPct val="0"/>
+              </a:spcAft>
+              <a:defRPr>
+                <a:solidFill>
+                  <a:schemeClr val="tx1"/>
+                </a:solidFill>
+                <a:latin typeface="Calibri" pitchFamily="34" charset="0"/>
+              </a:defRPr>
+            </a:lvl7pPr>
+            <a:lvl8pPr marL="3429000" indent="-228600" fontAlgn="base">
+              <a:spcBef>
+                <a:spcPct val="0"/>
+              </a:spcBef>
+              <a:spcAft>
+                <a:spcPct val="0"/>
+              </a:spcAft>
+              <a:defRPr>
+                <a:solidFill>
+                  <a:schemeClr val="tx1"/>
+                </a:solidFill>
+                <a:latin typeface="Calibri" pitchFamily="34" charset="0"/>
+              </a:defRPr>
+            </a:lvl8pPr>
+            <a:lvl9pPr marL="3886200" indent="-228600" fontAlgn="base">
+              <a:spcBef>
+                <a:spcPct val="0"/>
+              </a:spcBef>
+              <a:spcAft>
+                <a:spcPct val="0"/>
+              </a:spcAft>
+              <a:defRPr>
+                <a:solidFill>
+                  <a:schemeClr val="tx1"/>
+                </a:solidFill>
+                <a:latin typeface="Calibri" pitchFamily="34" charset="0"/>
+              </a:defRPr>
+            </a:lvl9pPr>
+          </a:lstStyle>
+          <a:p>
+            <a:pPr marL="0" marR="0" lvl="0" indent="0" algn="ctr" defTabSz="914400" eaLnBrk="1" fontAlgn="auto" latinLnBrk="0" hangingPunct="1">
+              <a:lnSpc>
+                <a:spcPct val="100000"/>
+              </a:lnSpc>
+              <a:spcBef>
+                <a:spcPts val="0"/>
+              </a:spcBef>
+              <a:spcAft>
+                <a:spcPts val="0"/>
+              </a:spcAft>
+              <a:buClrTx/>
+              <a:buSzTx/>
+              <a:buFontTx/>
+              <a:buNone/>
+              <a:tabLst/>
+              <a:defRPr/>
+            </a:pPr>
+            <a:r>
+              <a:rPr kumimoji="0" lang="en-US" altLang="en-US" sz="800" i="0" u="none" strike="noStrike" kern="0" cap="none" spc="0" normalizeH="0" baseline="0" noProof="0" dirty="0">
+                <a:ln>
+                  <a:noFill/>
+                </a:ln>
+                <a:solidFill>
+                  <a:prstClr val="black"/>
+                </a:solidFill>
+                <a:effectLst/>
+                <a:uLnTx/>
+                <a:uFillTx/>
+                <a:latin typeface="Arial"/>
+                <a:ea typeface="+mn-ea"/>
+                <a:cs typeface="+mn-cs"/>
+              </a:rPr>
+              <a:t>Concrete</a:t>
+            </a:r>
+          </a:p>
+          <a:p>
+            <a:pPr marL="0" marR="0" lvl="0" indent="0" algn="ctr" defTabSz="914400" eaLnBrk="1" fontAlgn="auto" latinLnBrk="0" hangingPunct="1">
+              <a:lnSpc>
+                <a:spcPct val="100000"/>
+              </a:lnSpc>
+              <a:spcBef>
+                <a:spcPts val="0"/>
+              </a:spcBef>
+              <a:spcAft>
+                <a:spcPts val="0"/>
+              </a:spcAft>
+              <a:buClrTx/>
+              <a:buSzTx/>
+              <a:buFontTx/>
+              <a:buNone/>
+              <a:tabLst/>
+              <a:defRPr/>
+            </a:pPr>
+            <a:r>
+              <a:rPr kumimoji="0" lang="en-US" altLang="en-US" sz="800" i="0" u="none" strike="noStrike" kern="0" cap="none" spc="0" normalizeH="0" baseline="0" noProof="0" dirty="0">
+                <a:ln>
+                  <a:noFill/>
+                </a:ln>
+                <a:solidFill>
+                  <a:prstClr val="black"/>
+                </a:solidFill>
+                <a:effectLst/>
+                <a:uLnTx/>
+                <a:uFillTx/>
+                <a:latin typeface="Arial"/>
+                <a:ea typeface="+mn-ea"/>
+                <a:cs typeface="+mn-cs"/>
+              </a:rPr>
+              <a:t>Node Type</a:t>
+            </a:r>
+          </a:p>
+        </p:txBody>
+      </p:sp>
+      <p:cxnSp>
+        <p:nvCxnSpPr>
+          <p:cNvPr id="5" name="Straight Arrow Connector 4">
+            <a:extLst>
+              <a:ext uri="{FF2B5EF4-FFF2-40B4-BE49-F238E27FC236}">
+                <a16:creationId xmlns:a16="http://schemas.microsoft.com/office/drawing/2014/main" id="{A4E8CD19-0767-2135-B5CE-83A86FFA02BA}"/>
+              </a:ext>
+            </a:extLst>
+          </p:cNvPr>
+          <p:cNvCxnSpPr>
+            <a:cxnSpLocks/>
+            <a:stCxn id="4" idx="0"/>
+            <a:endCxn id="3" idx="2"/>
+          </p:cNvCxnSpPr>
+          <p:nvPr/>
+        </p:nvCxnSpPr>
+        <p:spPr>
+          <a:xfrm flipH="1" flipV="1">
+            <a:off x="4549138" y="4288261"/>
+            <a:ext cx="1547" cy="308013"/>
+          </a:xfrm>
+          <a:prstGeom prst="straightConnector1">
+            <a:avLst/>
+          </a:prstGeom>
+          <a:noFill/>
+          <a:ln w="3175" cap="flat" cmpd="sng" algn="ctr">
+            <a:solidFill>
+              <a:srgbClr val="C0504D">
+                <a:shade val="95000"/>
+                <a:satMod val="105000"/>
+              </a:srgbClr>
+            </a:solidFill>
+            <a:prstDash val="solid"/>
+            <a:tailEnd type="triangle"/>
+          </a:ln>
+          <a:effectLst/>
+        </p:spPr>
+      </p:cxnSp>
+      <p:cxnSp>
+        <p:nvCxnSpPr>
+          <p:cNvPr id="8" name="Straight Arrow Connector 7">
+            <a:extLst>
+              <a:ext uri="{FF2B5EF4-FFF2-40B4-BE49-F238E27FC236}">
+                <a16:creationId xmlns:a16="http://schemas.microsoft.com/office/drawing/2014/main" id="{F907D006-7846-6381-DD82-50E3FCD7991F}"/>
+              </a:ext>
+            </a:extLst>
+          </p:cNvPr>
+          <p:cNvCxnSpPr>
+            <a:cxnSpLocks/>
+            <a:stCxn id="7" idx="0"/>
+            <a:endCxn id="3" idx="2"/>
+          </p:cNvCxnSpPr>
+          <p:nvPr/>
+        </p:nvCxnSpPr>
+        <p:spPr>
+          <a:xfrm flipH="1" flipV="1">
+            <a:off x="4549138" y="4288261"/>
+            <a:ext cx="813921" cy="308013"/>
+          </a:xfrm>
+          <a:prstGeom prst="straightConnector1">
+            <a:avLst/>
+          </a:prstGeom>
+          <a:noFill/>
+          <a:ln w="3175" cap="flat" cmpd="sng" algn="ctr">
+            <a:solidFill>
+              <a:srgbClr val="C0504D">
+                <a:shade val="95000"/>
+                <a:satMod val="105000"/>
+              </a:srgbClr>
+            </a:solidFill>
+            <a:prstDash val="solid"/>
+            <a:tailEnd type="triangle"/>
+          </a:ln>
+          <a:effectLst/>
+        </p:spPr>
+      </p:cxnSp>
+      <p:cxnSp>
+        <p:nvCxnSpPr>
+          <p:cNvPr id="21" name="Straight Connector 20">
+            <a:extLst>
+              <a:ext uri="{FF2B5EF4-FFF2-40B4-BE49-F238E27FC236}">
+                <a16:creationId xmlns:a16="http://schemas.microsoft.com/office/drawing/2014/main" id="{90163A1D-A414-7345-020B-5FAD8D80F6D6}"/>
+              </a:ext>
+            </a:extLst>
+          </p:cNvPr>
+          <p:cNvCxnSpPr>
+            <a:cxnSpLocks/>
+          </p:cNvCxnSpPr>
+          <p:nvPr/>
+        </p:nvCxnSpPr>
+        <p:spPr>
+          <a:xfrm>
+            <a:off x="6297287" y="3760285"/>
+            <a:ext cx="1643423" cy="0"/>
+          </a:xfrm>
+          <a:prstGeom prst="line">
+            <a:avLst/>
+          </a:prstGeom>
+          <a:noFill/>
+          <a:ln w="28575" cap="flat" cmpd="sng" algn="ctr">
+            <a:solidFill>
+              <a:srgbClr val="7030A0"/>
+            </a:solidFill>
+            <a:prstDash val="dash"/>
+          </a:ln>
+          <a:effectLst/>
+        </p:spPr>
+      </p:cxnSp>
+      <p:cxnSp>
+        <p:nvCxnSpPr>
+          <p:cNvPr id="25" name="Straight Connector 24">
+            <a:extLst>
+              <a:ext uri="{FF2B5EF4-FFF2-40B4-BE49-F238E27FC236}">
+                <a16:creationId xmlns:a16="http://schemas.microsoft.com/office/drawing/2014/main" id="{4C820B57-B42F-FBD6-F65E-249734D0556E}"/>
+              </a:ext>
+            </a:extLst>
+          </p:cNvPr>
+          <p:cNvCxnSpPr>
+            <a:cxnSpLocks/>
+          </p:cNvCxnSpPr>
+          <p:nvPr/>
+        </p:nvCxnSpPr>
+        <p:spPr>
+          <a:xfrm>
+            <a:off x="6297607" y="3097717"/>
+            <a:ext cx="1643423" cy="0"/>
+          </a:xfrm>
+          <a:prstGeom prst="line">
+            <a:avLst/>
+          </a:prstGeom>
+          <a:noFill/>
+          <a:ln w="28575" cap="flat" cmpd="sng" algn="ctr">
+            <a:solidFill>
+              <a:srgbClr val="7030A0"/>
+            </a:solidFill>
+            <a:prstDash val="dash"/>
+          </a:ln>
+          <a:effectLst/>
+        </p:spPr>
+      </p:cxnSp>
+      <p:sp>
+        <p:nvSpPr>
+          <p:cNvPr id="30" name="Rectangle 29">
+            <a:extLst>
+              <a:ext uri="{FF2B5EF4-FFF2-40B4-BE49-F238E27FC236}">
+                <a16:creationId xmlns:a16="http://schemas.microsoft.com/office/drawing/2014/main" id="{55EF557D-0B15-0C5B-F2EE-808D438A15F7}"/>
+              </a:ext>
+            </a:extLst>
+          </p:cNvPr>
+          <p:cNvSpPr/>
+          <p:nvPr/>
+        </p:nvSpPr>
+        <p:spPr>
+          <a:xfrm>
+            <a:off x="6292813" y="2583553"/>
+            <a:ext cx="1627721" cy="365760"/>
+          </a:xfrm>
+          <a:prstGeom prst="rect">
+            <a:avLst/>
+          </a:prstGeom>
+          <a:solidFill>
+            <a:srgbClr val="8064A2">
+              <a:alpha val="20000"/>
+            </a:srgbClr>
+          </a:solidFill>
+          <a:ln w="3175" cap="flat" cmpd="sng" algn="ctr">
+            <a:solidFill>
+              <a:srgbClr val="7030A0"/>
+            </a:solidFill>
+            <a:prstDash val="solid"/>
+          </a:ln>
+          <a:effectLst/>
+        </p:spPr>
+        <p:txBody>
+          <a:bodyPr rtlCol="0" anchor="ctr"/>
+          <a:lstStyle/>
+          <a:p>
+            <a:pPr marL="0" marR="0" lvl="0" indent="0" algn="ctr" defTabSz="914400" eaLnBrk="1" fontAlgn="auto" latinLnBrk="0" hangingPunct="1">
+              <a:lnSpc>
+                <a:spcPct val="100000"/>
+              </a:lnSpc>
+              <a:spcBef>
+                <a:spcPts val="0"/>
+              </a:spcBef>
+              <a:spcAft>
+                <a:spcPts val="0"/>
+              </a:spcAft>
+              <a:buClrTx/>
+              <a:buSzTx/>
+              <a:buFontTx/>
+              <a:buNone/>
+              <a:tabLst/>
+              <a:defRPr/>
+            </a:pPr>
+            <a:r>
+              <a:rPr kumimoji="0" lang="en-US" sz="1100" b="0" i="0" u="none" strike="noStrike" kern="0" cap="none" spc="0" normalizeH="0" baseline="0" noProof="0" dirty="0">
+                <a:ln>
+                  <a:noFill/>
+                </a:ln>
+                <a:solidFill>
+                  <a:prstClr val="white"/>
+                </a:solidFill>
+                <a:effectLst/>
+                <a:uLnTx/>
+                <a:uFillTx/>
+                <a:latin typeface="Arial"/>
+                <a:ea typeface="+mn-ea"/>
+                <a:cs typeface="+mn-cs"/>
+              </a:rPr>
+              <a:t>System View</a:t>
+            </a:r>
+          </a:p>
+        </p:txBody>
+      </p:sp>
+      <p:sp>
+        <p:nvSpPr>
+          <p:cNvPr id="32" name="Rectangle 31">
+            <a:extLst>
+              <a:ext uri="{FF2B5EF4-FFF2-40B4-BE49-F238E27FC236}">
+                <a16:creationId xmlns:a16="http://schemas.microsoft.com/office/drawing/2014/main" id="{A5656BA8-3DA9-B8F5-451A-0BE99889ADD4}"/>
+              </a:ext>
+            </a:extLst>
+          </p:cNvPr>
+          <p:cNvSpPr/>
+          <p:nvPr/>
+        </p:nvSpPr>
+        <p:spPr>
+          <a:xfrm>
+            <a:off x="6313310" y="3908689"/>
+            <a:ext cx="1627720" cy="365760"/>
+          </a:xfrm>
+          <a:prstGeom prst="rect">
+            <a:avLst/>
+          </a:prstGeom>
+          <a:solidFill>
+            <a:srgbClr val="8064A2">
+              <a:lumMod val="20000"/>
+              <a:lumOff val="80000"/>
+            </a:srgbClr>
+          </a:solidFill>
+          <a:ln w="9525" cap="flat" cmpd="sng" algn="ctr">
+            <a:solidFill>
+              <a:srgbClr val="7030A0"/>
+            </a:solidFill>
+            <a:prstDash val="solid"/>
+          </a:ln>
+          <a:effectLst/>
+        </p:spPr>
+        <p:txBody>
+          <a:bodyPr rtlCol="0" anchor="ctr"/>
+          <a:lstStyle/>
+          <a:p>
+            <a:pPr marL="0" marR="0" lvl="0" indent="0" algn="ctr" defTabSz="914400" eaLnBrk="1" fontAlgn="auto" latinLnBrk="0" hangingPunct="1">
+              <a:lnSpc>
+                <a:spcPct val="100000"/>
+              </a:lnSpc>
+              <a:spcBef>
+                <a:spcPts val="0"/>
+              </a:spcBef>
+              <a:spcAft>
+                <a:spcPts val="0"/>
+              </a:spcAft>
+              <a:buClrTx/>
+              <a:buSzTx/>
+              <a:buFontTx/>
+              <a:buNone/>
+              <a:tabLst/>
+              <a:defRPr/>
+            </a:pPr>
+            <a:r>
+              <a:rPr kumimoji="0" lang="en-US" sz="1100" b="0" i="0" u="none" strike="noStrike" kern="0" cap="none" spc="0" normalizeH="0" baseline="0" noProof="0" dirty="0">
+                <a:ln>
+                  <a:noFill/>
+                </a:ln>
+                <a:solidFill>
+                  <a:prstClr val="black"/>
+                </a:solidFill>
+                <a:effectLst/>
+                <a:uLnTx/>
+                <a:uFillTx/>
+                <a:latin typeface="Arial"/>
+                <a:ea typeface="+mn-ea"/>
+                <a:cs typeface="+mn-cs"/>
+              </a:rPr>
+              <a:t>Device View</a:t>
+            </a:r>
+          </a:p>
+        </p:txBody>
+      </p:sp>
+      <p:sp>
+        <p:nvSpPr>
+          <p:cNvPr id="34" name="Rectangle 33">
+            <a:extLst>
+              <a:ext uri="{FF2B5EF4-FFF2-40B4-BE49-F238E27FC236}">
+                <a16:creationId xmlns:a16="http://schemas.microsoft.com/office/drawing/2014/main" id="{497FF8F2-501A-BD70-85AE-B6BF535BCF1D}"/>
+              </a:ext>
+            </a:extLst>
+          </p:cNvPr>
+          <p:cNvSpPr/>
+          <p:nvPr/>
+        </p:nvSpPr>
+        <p:spPr>
+          <a:xfrm>
+            <a:off x="6315346" y="3246121"/>
+            <a:ext cx="1627721" cy="365760"/>
+          </a:xfrm>
+          <a:prstGeom prst="rect">
+            <a:avLst/>
+          </a:prstGeom>
+          <a:solidFill>
+            <a:srgbClr val="8064A2">
+              <a:lumMod val="60000"/>
+              <a:lumOff val="40000"/>
+              <a:alpha val="20000"/>
+            </a:srgbClr>
+          </a:solidFill>
+          <a:ln w="9525" cap="flat" cmpd="sng" algn="ctr">
+            <a:solidFill>
+              <a:srgbClr val="7030A0"/>
+            </a:solidFill>
+            <a:prstDash val="solid"/>
+          </a:ln>
+          <a:effectLst/>
+        </p:spPr>
+        <p:txBody>
+          <a:bodyPr rtlCol="0" anchor="ctr"/>
+          <a:lstStyle/>
+          <a:p>
+            <a:pPr marL="0" marR="0" lvl="0" indent="0" algn="ctr" defTabSz="914400" eaLnBrk="1" fontAlgn="auto" latinLnBrk="0" hangingPunct="1">
+              <a:lnSpc>
+                <a:spcPct val="100000"/>
+              </a:lnSpc>
+              <a:spcBef>
+                <a:spcPts val="0"/>
+              </a:spcBef>
+              <a:spcAft>
+                <a:spcPts val="0"/>
+              </a:spcAft>
+              <a:buClrTx/>
+              <a:buSzTx/>
+              <a:buFontTx/>
+              <a:buNone/>
+              <a:tabLst/>
+              <a:defRPr/>
+            </a:pPr>
+            <a:r>
+              <a:rPr kumimoji="0" lang="en-US" sz="1100" b="0" i="0" u="none" strike="noStrike" kern="0" cap="none" spc="0" normalizeH="0" baseline="0" noProof="0" dirty="0">
+                <a:ln>
+                  <a:noFill/>
+                </a:ln>
+                <a:solidFill>
+                  <a:prstClr val="white"/>
+                </a:solidFill>
+                <a:effectLst/>
+                <a:uLnTx/>
+                <a:uFillTx/>
+                <a:latin typeface="Arial"/>
+                <a:ea typeface="+mn-ea"/>
+                <a:cs typeface="+mn-cs"/>
+              </a:rPr>
+              <a:t>Administrator View</a:t>
+            </a:r>
+          </a:p>
+        </p:txBody>
+      </p:sp>
+      <p:sp>
+        <p:nvSpPr>
+          <p:cNvPr id="37" name="Arrow: Curved Right 36">
+            <a:extLst>
+              <a:ext uri="{FF2B5EF4-FFF2-40B4-BE49-F238E27FC236}">
+                <a16:creationId xmlns:a16="http://schemas.microsoft.com/office/drawing/2014/main" id="{23BDC3DB-7AF8-F76F-2731-3C798587EC30}"/>
+              </a:ext>
+            </a:extLst>
+          </p:cNvPr>
+          <p:cNvSpPr/>
+          <p:nvPr/>
+        </p:nvSpPr>
+        <p:spPr>
+          <a:xfrm>
+            <a:off x="5786985" y="4053423"/>
+            <a:ext cx="406187" cy="777690"/>
+          </a:xfrm>
+          <a:prstGeom prst="curvedRightArrow">
+            <a:avLst/>
+          </a:prstGeom>
+          <a:solidFill>
+            <a:srgbClr val="8064A2">
+              <a:lumMod val="60000"/>
+              <a:lumOff val="40000"/>
+            </a:srgbClr>
+          </a:solidFill>
+          <a:ln w="9525" cap="flat" cmpd="sng" algn="ctr">
+            <a:solidFill>
+              <a:srgbClr val="7030A0"/>
+            </a:solidFill>
+            <a:prstDash val="solid"/>
+          </a:ln>
+          <a:effectLst/>
+        </p:spPr>
+        <p:txBody>
+          <a:bodyPr rtlCol="0" anchor="ctr"/>
+          <a:lstStyle/>
+          <a:p>
+            <a:pPr marL="0" marR="0" lvl="0" indent="0" algn="ctr" defTabSz="914400" eaLnBrk="1" fontAlgn="auto" latinLnBrk="0" hangingPunct="1">
+              <a:lnSpc>
+                <a:spcPct val="100000"/>
+              </a:lnSpc>
+              <a:spcBef>
+                <a:spcPts val="0"/>
+              </a:spcBef>
+              <a:spcAft>
+                <a:spcPts val="0"/>
+              </a:spcAft>
+              <a:buClrTx/>
+              <a:buSzTx/>
+              <a:buFontTx/>
+              <a:buNone/>
+              <a:tabLst/>
+              <a:defRPr/>
+            </a:pPr>
+            <a:endParaRPr kumimoji="0" lang="en-US" sz="1800" b="0" i="0" u="none" strike="noStrike" kern="0" cap="none" spc="0" normalizeH="0" baseline="0" noProof="0">
+              <a:ln>
+                <a:noFill/>
+              </a:ln>
+              <a:solidFill>
+                <a:prstClr val="white"/>
+              </a:solidFill>
+              <a:effectLst/>
+              <a:uLnTx/>
+              <a:uFillTx/>
+              <a:latin typeface="Arial"/>
+              <a:ea typeface="+mn-ea"/>
+              <a:cs typeface="+mn-cs"/>
+            </a:endParaRPr>
+          </a:p>
+        </p:txBody>
+      </p:sp>
+      <p:sp>
+        <p:nvSpPr>
+          <p:cNvPr id="2" name="Rectangle 1">
+            <a:extLst>
+              <a:ext uri="{FF2B5EF4-FFF2-40B4-BE49-F238E27FC236}">
+                <a16:creationId xmlns:a16="http://schemas.microsoft.com/office/drawing/2014/main" id="{0B0AA200-486F-F2CB-B1B0-87E1901C28B0}"/>
+              </a:ext>
+            </a:extLst>
+          </p:cNvPr>
+          <p:cNvSpPr/>
+          <p:nvPr/>
+        </p:nvSpPr>
+        <p:spPr>
+          <a:xfrm>
+            <a:off x="6313310" y="4571257"/>
+            <a:ext cx="1643423" cy="365760"/>
+          </a:xfrm>
+          <a:prstGeom prst="rect">
+            <a:avLst/>
+          </a:prstGeom>
+          <a:solidFill>
+            <a:srgbClr val="8064A2">
+              <a:lumMod val="20000"/>
+              <a:lumOff val="80000"/>
+            </a:srgbClr>
+          </a:solidFill>
+          <a:ln w="3175" cap="flat" cmpd="sng" algn="ctr">
+            <a:solidFill>
+              <a:srgbClr val="7030A0"/>
+            </a:solidFill>
+            <a:prstDash val="solid"/>
+          </a:ln>
+          <a:effectLst/>
+        </p:spPr>
+        <p:txBody>
+          <a:bodyPr rtlCol="0" anchor="ctr"/>
+          <a:lstStyle/>
+          <a:p>
+            <a:pPr marL="0" marR="0" lvl="0" indent="0" algn="ctr" defTabSz="914400" eaLnBrk="1" fontAlgn="auto" latinLnBrk="0" hangingPunct="1">
+              <a:lnSpc>
+                <a:spcPct val="100000"/>
+              </a:lnSpc>
+              <a:spcBef>
+                <a:spcPts val="0"/>
+              </a:spcBef>
+              <a:spcAft>
+                <a:spcPts val="0"/>
+              </a:spcAft>
+              <a:buClrTx/>
+              <a:buSzTx/>
+              <a:buFontTx/>
+              <a:buNone/>
+              <a:tabLst/>
+              <a:defRPr/>
+            </a:pPr>
+            <a:r>
+              <a:rPr kumimoji="0" lang="en-US" sz="1100" b="0" i="0" u="none" strike="noStrike" kern="0" cap="none" spc="0" normalizeH="0" baseline="0" noProof="0" dirty="0">
+                <a:ln>
+                  <a:noFill/>
+                </a:ln>
+                <a:solidFill>
+                  <a:prstClr val="black"/>
+                </a:solidFill>
+                <a:effectLst/>
+                <a:uLnTx/>
+                <a:uFillTx/>
+                <a:latin typeface="Arial"/>
+                <a:ea typeface="+mn-ea"/>
+                <a:cs typeface="+mn-cs"/>
+              </a:rPr>
+              <a:t>Instance View</a:t>
+            </a:r>
+          </a:p>
+        </p:txBody>
+      </p:sp>
+      <p:cxnSp>
+        <p:nvCxnSpPr>
+          <p:cNvPr id="6" name="Straight Connector 5">
+            <a:extLst>
+              <a:ext uri="{FF2B5EF4-FFF2-40B4-BE49-F238E27FC236}">
+                <a16:creationId xmlns:a16="http://schemas.microsoft.com/office/drawing/2014/main" id="{8D362E1E-440C-98A5-90F0-06C24BE050F4}"/>
+              </a:ext>
+            </a:extLst>
+          </p:cNvPr>
+          <p:cNvCxnSpPr>
+            <a:cxnSpLocks/>
+          </p:cNvCxnSpPr>
+          <p:nvPr/>
+        </p:nvCxnSpPr>
+        <p:spPr>
+          <a:xfrm>
+            <a:off x="6313310" y="4424749"/>
+            <a:ext cx="1643423" cy="0"/>
+          </a:xfrm>
+          <a:prstGeom prst="line">
+            <a:avLst/>
+          </a:prstGeom>
+          <a:noFill/>
+          <a:ln w="28575" cap="flat" cmpd="sng" algn="ctr">
+            <a:solidFill>
+              <a:srgbClr val="7030A0"/>
+            </a:solidFill>
+            <a:prstDash val="dash"/>
+          </a:ln>
+          <a:effectLst/>
+        </p:spPr>
+      </p:cxnSp>
+      <p:grpSp>
+        <p:nvGrpSpPr>
+          <p:cNvPr id="10" name="Group 9">
+            <a:extLst>
+              <a:ext uri="{FF2B5EF4-FFF2-40B4-BE49-F238E27FC236}">
+                <a16:creationId xmlns:a16="http://schemas.microsoft.com/office/drawing/2014/main" id="{064BAC5C-107D-0732-B254-EF4E67803B2D}"/>
+              </a:ext>
+            </a:extLst>
+          </p:cNvPr>
+          <p:cNvGrpSpPr/>
+          <p:nvPr/>
+        </p:nvGrpSpPr>
+        <p:grpSpPr>
+          <a:xfrm>
+            <a:off x="3433466" y="4596274"/>
+            <a:ext cx="2231345" cy="365760"/>
+            <a:chOff x="3433466" y="4596274"/>
+            <a:chExt cx="2231345" cy="365760"/>
+          </a:xfrm>
+        </p:grpSpPr>
+        <p:sp>
+          <p:nvSpPr>
+            <p:cNvPr id="4" name="Web Server Tier">
+              <a:extLst>
+                <a:ext uri="{FF2B5EF4-FFF2-40B4-BE49-F238E27FC236}">
+                  <a16:creationId xmlns:a16="http://schemas.microsoft.com/office/drawing/2014/main" id="{9FA15A96-A3D2-B08F-CF14-595C0D22DC1F}"/>
+                </a:ext>
+              </a:extLst>
+            </p:cNvPr>
+            <p:cNvSpPr>
+              <a:spLocks noChangeArrowheads="1"/>
+            </p:cNvSpPr>
+            <p:nvPr/>
+          </p:nvSpPr>
+          <p:spPr bwMode="auto">
+            <a:xfrm>
+              <a:off x="4248933" y="4596274"/>
+              <a:ext cx="603504" cy="365760"/>
+            </a:xfrm>
+            <a:prstGeom prst="roundRect">
+              <a:avLst>
+                <a:gd name="adj" fmla="val 16667"/>
+              </a:avLst>
+            </a:prstGeom>
+            <a:gradFill rotWithShape="1">
+              <a:gsLst>
+                <a:gs pos="0">
+                  <a:srgbClr val="8064A2">
+                    <a:tint val="50000"/>
+                    <a:satMod val="300000"/>
+                  </a:srgbClr>
+                </a:gs>
+                <a:gs pos="35000">
+                  <a:srgbClr val="8064A2">
+                    <a:tint val="37000"/>
+                    <a:satMod val="300000"/>
+                  </a:srgbClr>
+                </a:gs>
+                <a:gs pos="100000">
+                  <a:srgbClr val="8064A2">
+                    <a:tint val="15000"/>
+                    <a:satMod val="350000"/>
+                  </a:srgbClr>
+                </a:gs>
+              </a:gsLst>
+              <a:lin ang="16200000" scaled="1"/>
+            </a:gradFill>
+            <a:ln w="3175" cap="flat" cmpd="sng" algn="ctr">
+              <a:solidFill>
+                <a:srgbClr val="8064A2">
+                  <a:shade val="95000"/>
+                  <a:satMod val="105000"/>
+                </a:srgbClr>
+              </a:solidFill>
+              <a:prstDash val="solid"/>
+              <a:headEnd/>
+              <a:tailEnd/>
+            </a:ln>
+            <a:effectLst>
+              <a:outerShdw blurRad="40000" dist="20000" dir="5400000" rotWithShape="0">
+                <a:srgbClr val="000000">
+                  <a:alpha val="38000"/>
+                </a:srgbClr>
+              </a:outerShdw>
+            </a:effectLst>
+          </p:spPr>
+          <p:txBody>
+            <a:bodyPr lIns="0" tIns="0" rIns="0" bIns="0" anchor="ctr" anchorCtr="0"/>
+            <a:lstStyle>
+              <a:lvl1pPr>
+                <a:defRPr>
+                  <a:solidFill>
+                    <a:schemeClr val="tx1"/>
+                  </a:solidFill>
+                  <a:latin typeface="Calibri" pitchFamily="34" charset="0"/>
+                </a:defRPr>
+              </a:lvl1pPr>
+              <a:lvl2pPr marL="742950" indent="-285750">
+                <a:defRPr>
+                  <a:solidFill>
+                    <a:schemeClr val="tx1"/>
+                  </a:solidFill>
+                  <a:latin typeface="Calibri" pitchFamily="34" charset="0"/>
+                </a:defRPr>
+              </a:lvl2pPr>
+              <a:lvl3pPr marL="1143000" indent="-228600">
+                <a:defRPr>
+                  <a:solidFill>
+                    <a:schemeClr val="tx1"/>
+                  </a:solidFill>
+                  <a:latin typeface="Calibri" pitchFamily="34" charset="0"/>
+                </a:defRPr>
+              </a:lvl3pPr>
+              <a:lvl4pPr marL="1600200" indent="-228600">
+                <a:defRPr>
+                  <a:solidFill>
+                    <a:schemeClr val="tx1"/>
+                  </a:solidFill>
+                  <a:latin typeface="Calibri" pitchFamily="34" charset="0"/>
+                </a:defRPr>
+              </a:lvl4pPr>
+              <a:lvl5pPr marL="2057400" indent="-228600">
+                <a:defRPr>
+                  <a:solidFill>
+                    <a:schemeClr val="tx1"/>
+                  </a:solidFill>
+                  <a:latin typeface="Calibri" pitchFamily="34" charset="0"/>
+                </a:defRPr>
+              </a:lvl5pPr>
+              <a:lvl6pPr marL="2514600" indent="-228600" fontAlgn="base">
+                <a:spcBef>
+                  <a:spcPct val="0"/>
+                </a:spcBef>
+                <a:spcAft>
+                  <a:spcPct val="0"/>
+                </a:spcAft>
+                <a:defRPr>
+                  <a:solidFill>
+                    <a:schemeClr val="tx1"/>
+                  </a:solidFill>
+                  <a:latin typeface="Calibri" pitchFamily="34" charset="0"/>
+                </a:defRPr>
+              </a:lvl6pPr>
+              <a:lvl7pPr marL="2971800" indent="-228600" fontAlgn="base">
+                <a:spcBef>
+                  <a:spcPct val="0"/>
+                </a:spcBef>
+                <a:spcAft>
+                  <a:spcPct val="0"/>
+                </a:spcAft>
+                <a:defRPr>
+                  <a:solidFill>
+                    <a:schemeClr val="tx1"/>
+                  </a:solidFill>
+                  <a:latin typeface="Calibri" pitchFamily="34" charset="0"/>
+                </a:defRPr>
+              </a:lvl7pPr>
+              <a:lvl8pPr marL="3429000" indent="-228600" fontAlgn="base">
+                <a:spcBef>
+                  <a:spcPct val="0"/>
+                </a:spcBef>
+                <a:spcAft>
+                  <a:spcPct val="0"/>
+                </a:spcAft>
+                <a:defRPr>
+                  <a:solidFill>
+                    <a:schemeClr val="tx1"/>
+                  </a:solidFill>
+                  <a:latin typeface="Calibri" pitchFamily="34" charset="0"/>
+                </a:defRPr>
+              </a:lvl8pPr>
+              <a:lvl9pPr marL="3886200" indent="-228600" fontAlgn="base">
+                <a:spcBef>
+                  <a:spcPct val="0"/>
+                </a:spcBef>
+                <a:spcAft>
+                  <a:spcPct val="0"/>
+                </a:spcAft>
+                <a:defRPr>
+                  <a:solidFill>
+                    <a:schemeClr val="tx1"/>
+                  </a:solidFill>
+                  <a:latin typeface="Calibri" pitchFamily="34" charset="0"/>
+                </a:defRPr>
+              </a:lvl9pPr>
+            </a:lstStyle>
+            <a:p>
+              <a:pPr algn="ctr"/>
+              <a:r>
+                <a:rPr lang="en-US" altLang="en-US" sz="800" kern="0" dirty="0">
+                  <a:solidFill>
+                    <a:prstClr val="black"/>
+                  </a:solidFill>
+                  <a:latin typeface="Arial"/>
+                </a:rPr>
+                <a:t>Concrete</a:t>
+              </a:r>
+            </a:p>
+            <a:p>
+              <a:pPr algn="ctr"/>
+              <a:r>
+                <a:rPr lang="en-US" altLang="en-US" sz="800" kern="0" dirty="0">
+                  <a:solidFill>
+                    <a:prstClr val="black"/>
+                  </a:solidFill>
+                  <a:latin typeface="Arial"/>
+                </a:rPr>
+                <a:t>Ansible Type</a:t>
+              </a:r>
+            </a:p>
+          </p:txBody>
+        </p:sp>
+        <p:sp>
+          <p:nvSpPr>
+            <p:cNvPr id="7" name="Web Server Tier">
+              <a:extLst>
+                <a:ext uri="{FF2B5EF4-FFF2-40B4-BE49-F238E27FC236}">
+                  <a16:creationId xmlns:a16="http://schemas.microsoft.com/office/drawing/2014/main" id="{54AFEE4B-6F70-7B85-6A9A-350900D7A081}"/>
+                </a:ext>
+              </a:extLst>
+            </p:cNvPr>
+            <p:cNvSpPr>
+              <a:spLocks noChangeArrowheads="1"/>
+            </p:cNvSpPr>
+            <p:nvPr/>
+          </p:nvSpPr>
+          <p:spPr bwMode="auto">
+            <a:xfrm>
+              <a:off x="5061307" y="4596274"/>
+              <a:ext cx="603504" cy="365760"/>
+            </a:xfrm>
+            <a:prstGeom prst="roundRect">
+              <a:avLst>
+                <a:gd name="adj" fmla="val 16667"/>
+              </a:avLst>
+            </a:prstGeom>
+            <a:gradFill rotWithShape="1">
+              <a:gsLst>
+                <a:gs pos="0">
+                  <a:srgbClr val="8064A2">
+                    <a:tint val="50000"/>
+                    <a:satMod val="300000"/>
+                  </a:srgbClr>
+                </a:gs>
+                <a:gs pos="35000">
+                  <a:srgbClr val="8064A2">
+                    <a:tint val="37000"/>
+                    <a:satMod val="300000"/>
+                  </a:srgbClr>
+                </a:gs>
+                <a:gs pos="100000">
+                  <a:srgbClr val="8064A2">
+                    <a:tint val="15000"/>
+                    <a:satMod val="350000"/>
+                  </a:srgbClr>
+                </a:gs>
+              </a:gsLst>
+              <a:lin ang="16200000" scaled="1"/>
+            </a:gradFill>
+            <a:ln w="3175" cap="flat" cmpd="sng" algn="ctr">
+              <a:solidFill>
+                <a:srgbClr val="8064A2">
+                  <a:shade val="95000"/>
+                  <a:satMod val="105000"/>
+                </a:srgbClr>
+              </a:solidFill>
+              <a:prstDash val="solid"/>
+              <a:headEnd/>
+              <a:tailEnd/>
+            </a:ln>
+            <a:effectLst>
+              <a:outerShdw blurRad="40000" dist="20000" dir="5400000" rotWithShape="0">
+                <a:srgbClr val="000000">
+                  <a:alpha val="38000"/>
+                </a:srgbClr>
+              </a:outerShdw>
+            </a:effectLst>
+          </p:spPr>
+          <p:txBody>
+            <a:bodyPr lIns="0" tIns="0" rIns="0" bIns="0" anchor="ctr" anchorCtr="0"/>
+            <a:lstStyle>
+              <a:lvl1pPr>
+                <a:defRPr>
+                  <a:solidFill>
+                    <a:schemeClr val="tx1"/>
+                  </a:solidFill>
+                  <a:latin typeface="Calibri" pitchFamily="34" charset="0"/>
+                </a:defRPr>
+              </a:lvl1pPr>
+              <a:lvl2pPr marL="742950" indent="-285750">
+                <a:defRPr>
+                  <a:solidFill>
+                    <a:schemeClr val="tx1"/>
+                  </a:solidFill>
+                  <a:latin typeface="Calibri" pitchFamily="34" charset="0"/>
+                </a:defRPr>
+              </a:lvl2pPr>
+              <a:lvl3pPr marL="1143000" indent="-228600">
+                <a:defRPr>
+                  <a:solidFill>
+                    <a:schemeClr val="tx1"/>
+                  </a:solidFill>
+                  <a:latin typeface="Calibri" pitchFamily="34" charset="0"/>
+                </a:defRPr>
+              </a:lvl3pPr>
+              <a:lvl4pPr marL="1600200" indent="-228600">
+                <a:defRPr>
+                  <a:solidFill>
+                    <a:schemeClr val="tx1"/>
+                  </a:solidFill>
+                  <a:latin typeface="Calibri" pitchFamily="34" charset="0"/>
+                </a:defRPr>
+              </a:lvl4pPr>
+              <a:lvl5pPr marL="2057400" indent="-228600">
+                <a:defRPr>
+                  <a:solidFill>
+                    <a:schemeClr val="tx1"/>
+                  </a:solidFill>
+                  <a:latin typeface="Calibri" pitchFamily="34" charset="0"/>
+                </a:defRPr>
+              </a:lvl5pPr>
+              <a:lvl6pPr marL="2514600" indent="-228600" fontAlgn="base">
+                <a:spcBef>
+                  <a:spcPct val="0"/>
+                </a:spcBef>
+                <a:spcAft>
+                  <a:spcPct val="0"/>
+                </a:spcAft>
+                <a:defRPr>
+                  <a:solidFill>
+                    <a:schemeClr val="tx1"/>
+                  </a:solidFill>
+                  <a:latin typeface="Calibri" pitchFamily="34" charset="0"/>
+                </a:defRPr>
+              </a:lvl6pPr>
+              <a:lvl7pPr marL="2971800" indent="-228600" fontAlgn="base">
+                <a:spcBef>
+                  <a:spcPct val="0"/>
+                </a:spcBef>
+                <a:spcAft>
+                  <a:spcPct val="0"/>
+                </a:spcAft>
+                <a:defRPr>
+                  <a:solidFill>
+                    <a:schemeClr val="tx1"/>
+                  </a:solidFill>
+                  <a:latin typeface="Calibri" pitchFamily="34" charset="0"/>
+                </a:defRPr>
+              </a:lvl7pPr>
+              <a:lvl8pPr marL="3429000" indent="-228600" fontAlgn="base">
+                <a:spcBef>
+                  <a:spcPct val="0"/>
+                </a:spcBef>
+                <a:spcAft>
+                  <a:spcPct val="0"/>
+                </a:spcAft>
+                <a:defRPr>
+                  <a:solidFill>
+                    <a:schemeClr val="tx1"/>
+                  </a:solidFill>
+                  <a:latin typeface="Calibri" pitchFamily="34" charset="0"/>
+                </a:defRPr>
+              </a:lvl8pPr>
+              <a:lvl9pPr marL="3886200" indent="-228600" fontAlgn="base">
+                <a:spcBef>
+                  <a:spcPct val="0"/>
+                </a:spcBef>
+                <a:spcAft>
+                  <a:spcPct val="0"/>
+                </a:spcAft>
+                <a:defRPr>
+                  <a:solidFill>
+                    <a:schemeClr val="tx1"/>
+                  </a:solidFill>
+                  <a:latin typeface="Calibri" pitchFamily="34" charset="0"/>
+                </a:defRPr>
+              </a:lvl9pPr>
+            </a:lstStyle>
+            <a:p>
+              <a:pPr algn="ctr"/>
+              <a:r>
+                <a:rPr lang="en-US" altLang="en-US" sz="800" kern="0" dirty="0">
+                  <a:solidFill>
+                    <a:prstClr val="black"/>
+                  </a:solidFill>
+                  <a:latin typeface="Arial"/>
+                </a:rPr>
+                <a:t>Concrete</a:t>
+              </a:r>
+            </a:p>
+            <a:p>
+              <a:pPr algn="ctr"/>
+              <a:r>
+                <a:rPr lang="en-US" altLang="en-US" sz="800" kern="0" dirty="0">
+                  <a:solidFill>
+                    <a:prstClr val="black"/>
+                  </a:solidFill>
+                  <a:latin typeface="Arial"/>
+                </a:rPr>
+                <a:t>Terraform Type</a:t>
+              </a:r>
+            </a:p>
+          </p:txBody>
+        </p:sp>
+        <p:sp>
+          <p:nvSpPr>
+            <p:cNvPr id="9" name="Web Server Tier">
+              <a:extLst>
+                <a:ext uri="{FF2B5EF4-FFF2-40B4-BE49-F238E27FC236}">
+                  <a16:creationId xmlns:a16="http://schemas.microsoft.com/office/drawing/2014/main" id="{0CFFFAC4-6F01-C4FF-C247-9B63FA60E196}"/>
+                </a:ext>
+              </a:extLst>
+            </p:cNvPr>
+            <p:cNvSpPr>
+              <a:spLocks noChangeArrowheads="1"/>
+            </p:cNvSpPr>
+            <p:nvPr/>
+          </p:nvSpPr>
+          <p:spPr bwMode="auto">
+            <a:xfrm>
+              <a:off x="3433466" y="4596274"/>
+              <a:ext cx="603504" cy="365760"/>
+            </a:xfrm>
+            <a:prstGeom prst="roundRect">
+              <a:avLst>
+                <a:gd name="adj" fmla="val 16667"/>
+              </a:avLst>
+            </a:prstGeom>
+            <a:gradFill rotWithShape="1">
+              <a:gsLst>
+                <a:gs pos="0">
+                  <a:srgbClr val="8064A2">
+                    <a:tint val="50000"/>
+                    <a:satMod val="300000"/>
+                  </a:srgbClr>
+                </a:gs>
+                <a:gs pos="35000">
+                  <a:srgbClr val="8064A2">
+                    <a:tint val="37000"/>
+                    <a:satMod val="300000"/>
+                  </a:srgbClr>
+                </a:gs>
+                <a:gs pos="100000">
+                  <a:srgbClr val="8064A2">
+                    <a:tint val="15000"/>
+                    <a:satMod val="350000"/>
+                  </a:srgbClr>
+                </a:gs>
+              </a:gsLst>
+              <a:lin ang="16200000" scaled="1"/>
+            </a:gradFill>
+            <a:ln w="3175" cap="flat" cmpd="sng" algn="ctr">
+              <a:solidFill>
+                <a:srgbClr val="8064A2">
+                  <a:shade val="95000"/>
+                  <a:satMod val="105000"/>
+                </a:srgbClr>
+              </a:solidFill>
+              <a:prstDash val="solid"/>
+              <a:headEnd/>
+              <a:tailEnd/>
+            </a:ln>
+            <a:effectLst>
+              <a:outerShdw blurRad="40000" dist="20000" dir="5400000" rotWithShape="0">
+                <a:srgbClr val="000000">
+                  <a:alpha val="38000"/>
+                </a:srgbClr>
+              </a:outerShdw>
+            </a:effectLst>
+          </p:spPr>
+          <p:txBody>
+            <a:bodyPr lIns="0" tIns="0" rIns="0" bIns="0" anchor="ctr" anchorCtr="0"/>
+            <a:lstStyle>
+              <a:lvl1pPr>
+                <a:defRPr>
+                  <a:solidFill>
+                    <a:schemeClr val="tx1"/>
+                  </a:solidFill>
+                  <a:latin typeface="Calibri" pitchFamily="34" charset="0"/>
+                </a:defRPr>
+              </a:lvl1pPr>
+              <a:lvl2pPr marL="742950" indent="-285750">
+                <a:defRPr>
+                  <a:solidFill>
+                    <a:schemeClr val="tx1"/>
+                  </a:solidFill>
+                  <a:latin typeface="Calibri" pitchFamily="34" charset="0"/>
+                </a:defRPr>
+              </a:lvl2pPr>
+              <a:lvl3pPr marL="1143000" indent="-228600">
+                <a:defRPr>
+                  <a:solidFill>
+                    <a:schemeClr val="tx1"/>
+                  </a:solidFill>
+                  <a:latin typeface="Calibri" pitchFamily="34" charset="0"/>
+                </a:defRPr>
+              </a:lvl3pPr>
+              <a:lvl4pPr marL="1600200" indent="-228600">
+                <a:defRPr>
+                  <a:solidFill>
+                    <a:schemeClr val="tx1"/>
+                  </a:solidFill>
+                  <a:latin typeface="Calibri" pitchFamily="34" charset="0"/>
+                </a:defRPr>
+              </a:lvl4pPr>
+              <a:lvl5pPr marL="2057400" indent="-228600">
+                <a:defRPr>
+                  <a:solidFill>
+                    <a:schemeClr val="tx1"/>
+                  </a:solidFill>
+                  <a:latin typeface="Calibri" pitchFamily="34" charset="0"/>
+                </a:defRPr>
+              </a:lvl5pPr>
+              <a:lvl6pPr marL="2514600" indent="-228600" fontAlgn="base">
+                <a:spcBef>
+                  <a:spcPct val="0"/>
+                </a:spcBef>
+                <a:spcAft>
+                  <a:spcPct val="0"/>
+                </a:spcAft>
+                <a:defRPr>
+                  <a:solidFill>
+                    <a:schemeClr val="tx1"/>
+                  </a:solidFill>
+                  <a:latin typeface="Calibri" pitchFamily="34" charset="0"/>
+                </a:defRPr>
+              </a:lvl6pPr>
+              <a:lvl7pPr marL="2971800" indent="-228600" fontAlgn="base">
+                <a:spcBef>
+                  <a:spcPct val="0"/>
+                </a:spcBef>
+                <a:spcAft>
+                  <a:spcPct val="0"/>
+                </a:spcAft>
+                <a:defRPr>
+                  <a:solidFill>
+                    <a:schemeClr val="tx1"/>
+                  </a:solidFill>
+                  <a:latin typeface="Calibri" pitchFamily="34" charset="0"/>
+                </a:defRPr>
+              </a:lvl7pPr>
+              <a:lvl8pPr marL="3429000" indent="-228600" fontAlgn="base">
+                <a:spcBef>
+                  <a:spcPct val="0"/>
+                </a:spcBef>
+                <a:spcAft>
+                  <a:spcPct val="0"/>
+                </a:spcAft>
+                <a:defRPr>
+                  <a:solidFill>
+                    <a:schemeClr val="tx1"/>
+                  </a:solidFill>
+                  <a:latin typeface="Calibri" pitchFamily="34" charset="0"/>
+                </a:defRPr>
+              </a:lvl8pPr>
+              <a:lvl9pPr marL="3886200" indent="-228600" fontAlgn="base">
+                <a:spcBef>
+                  <a:spcPct val="0"/>
+                </a:spcBef>
+                <a:spcAft>
+                  <a:spcPct val="0"/>
+                </a:spcAft>
+                <a:defRPr>
+                  <a:solidFill>
+                    <a:schemeClr val="tx1"/>
+                  </a:solidFill>
+                  <a:latin typeface="Calibri" pitchFamily="34" charset="0"/>
+                </a:defRPr>
+              </a:lvl9pPr>
+            </a:lstStyle>
+            <a:p>
+              <a:pPr algn="ctr"/>
+              <a:r>
+                <a:rPr lang="en-US" altLang="en-US" sz="800" kern="0" dirty="0">
+                  <a:solidFill>
+                    <a:prstClr val="black"/>
+                  </a:solidFill>
+                  <a:latin typeface="Arial"/>
+                </a:rPr>
+                <a:t>Concrete</a:t>
+              </a:r>
+            </a:p>
+            <a:p>
+              <a:pPr algn="ctr"/>
+              <a:r>
+                <a:rPr lang="en-US" altLang="en-US" sz="800" kern="0" dirty="0">
+                  <a:solidFill>
+                    <a:prstClr val="black"/>
+                  </a:solidFill>
+                  <a:latin typeface="Arial"/>
+                </a:rPr>
+                <a:t>Bash Type</a:t>
+              </a:r>
+            </a:p>
+          </p:txBody>
+        </p:sp>
+      </p:grpSp>
+      <p:cxnSp>
+        <p:nvCxnSpPr>
+          <p:cNvPr id="11" name="Straight Arrow Connector 10">
+            <a:extLst>
+              <a:ext uri="{FF2B5EF4-FFF2-40B4-BE49-F238E27FC236}">
+                <a16:creationId xmlns:a16="http://schemas.microsoft.com/office/drawing/2014/main" id="{C4D44793-98B9-B178-93F2-3751AAB3F6CE}"/>
+              </a:ext>
+            </a:extLst>
+          </p:cNvPr>
+          <p:cNvCxnSpPr>
+            <a:cxnSpLocks/>
+            <a:stCxn id="9" idx="0"/>
+            <a:endCxn id="3" idx="2"/>
+          </p:cNvCxnSpPr>
+          <p:nvPr/>
+        </p:nvCxnSpPr>
+        <p:spPr>
+          <a:xfrm flipV="1">
+            <a:off x="3735218" y="4288261"/>
+            <a:ext cx="813920" cy="308013"/>
+          </a:xfrm>
+          <a:prstGeom prst="straightConnector1">
+            <a:avLst/>
+          </a:prstGeom>
+          <a:noFill/>
+          <a:ln w="3175" cap="flat" cmpd="sng" algn="ctr">
+            <a:solidFill>
+              <a:srgbClr val="C0504D">
+                <a:shade val="95000"/>
+                <a:satMod val="105000"/>
+              </a:srgbClr>
+            </a:solidFill>
+            <a:prstDash val="solid"/>
+            <a:tailEnd type="triangle"/>
+          </a:ln>
+          <a:effectLst/>
+        </p:spPr>
+      </p:cxnSp>
     </p:spTree>
     <p:extLst>
       <p:ext uri="{BB962C8B-B14F-4D97-AF65-F5344CB8AC3E}">
@@ -9019,7 +10842,7 @@
 </p:sld>
 </file>
 
-<file path=ppt/slides/slide7.xml><?xml version="1.0" encoding="utf-8"?>
+<file path=ppt/slides/slide8.xml><?xml version="1.0" encoding="utf-8"?>
 <p:sld xmlns:a="http://schemas.openxmlformats.org/drawingml/2006/main" xmlns:r="http://schemas.openxmlformats.org/officeDocument/2006/relationships" xmlns:p="http://schemas.openxmlformats.org/presentationml/2006/main">
   <p:cSld>
     <p:spTree>
@@ -9684,7 +11507,7 @@
 </p:sld>
 </file>
 
-<file path=ppt/slides/slide8.xml><?xml version="1.0" encoding="utf-8"?>
+<file path=ppt/slides/slide9.xml><?xml version="1.0" encoding="utf-8"?>
 <p:sld xmlns:a="http://schemas.openxmlformats.org/drawingml/2006/main" xmlns:r="http://schemas.openxmlformats.org/officeDocument/2006/relationships" xmlns:p="http://schemas.openxmlformats.org/presentationml/2006/main">
   <p:cSld>
     <p:spTree>

</xml_diff>